<commit_message>
Now using CV model in inferring api
</commit_message>
<xml_diff>
--- a/Barrelet_Xavier_7_presentation_082024.pptx
+++ b/Barrelet_Xavier_7_presentation_082024.pptx
@@ -347,7 +347,7 @@
         <p:spPr>
           <a:xfrm>
             <a:off x="0" y="4114800"/>
-            <a:ext cx="10068120" cy="1543320"/>
+            <a:ext cx="10067400" cy="1542600"/>
           </a:xfrm>
           <a:prstGeom prst="rect">
             <a:avLst/>
@@ -394,9 +394,9 @@
         <p:grpSpPr>
           <a:xfrm>
             <a:off x="0" y="0"/>
-            <a:ext cx="10068840" cy="4102920"/>
+            <a:ext cx="10068120" cy="4102200"/>
             <a:chOff x="0" y="0"/>
-            <a:chExt cx="10068840" cy="4102920"/>
+            <a:chExt cx="10068120" cy="4102200"/>
           </a:xfrm>
         </p:grpSpPr>
         <p:sp>
@@ -408,7 +408,7 @@
           <p:spPr>
             <a:xfrm>
               <a:off x="0" y="0"/>
-              <a:ext cx="10068840" cy="4102920"/>
+              <a:ext cx="10068120" cy="4102200"/>
             </a:xfrm>
             <a:prstGeom prst="rect">
               <a:avLst/>
@@ -455,7 +455,7 @@
           <p:spPr>
             <a:xfrm>
               <a:off x="0" y="1280160"/>
-              <a:ext cx="1542600" cy="628200"/>
+              <a:ext cx="1541880" cy="627480"/>
             </a:xfrm>
             <a:prstGeom prst="rect">
               <a:avLst/>
@@ -504,7 +504,7 @@
           <p:spPr>
             <a:xfrm>
               <a:off x="914400" y="1920240"/>
-              <a:ext cx="1268280" cy="1816920"/>
+              <a:ext cx="1267560" cy="1816200"/>
             </a:xfrm>
             <a:prstGeom prst="rect">
               <a:avLst/>
@@ -551,7 +551,7 @@
           <p:spPr>
             <a:xfrm>
               <a:off x="2194560" y="548640"/>
-              <a:ext cx="1268280" cy="1816920"/>
+              <a:ext cx="1267560" cy="1816200"/>
             </a:xfrm>
             <a:prstGeom prst="rect">
               <a:avLst/>
@@ -598,7 +598,7 @@
           <p:spPr>
             <a:xfrm>
               <a:off x="3474720" y="1188720"/>
-              <a:ext cx="353880" cy="353880"/>
+              <a:ext cx="353160" cy="353160"/>
             </a:xfrm>
             <a:prstGeom prst="rect">
               <a:avLst/>
@@ -645,7 +645,7 @@
           <p:spPr>
             <a:xfrm>
               <a:off x="4206240" y="0"/>
-              <a:ext cx="1451160" cy="902520"/>
+              <a:ext cx="1450440" cy="901800"/>
             </a:xfrm>
             <a:prstGeom prst="rect">
               <a:avLst/>
@@ -692,7 +692,7 @@
           <p:spPr>
             <a:xfrm>
               <a:off x="4663440" y="914400"/>
-              <a:ext cx="993960" cy="445320"/>
+              <a:ext cx="993240" cy="444600"/>
             </a:xfrm>
             <a:prstGeom prst="rect">
               <a:avLst/>
@@ -739,7 +739,7 @@
           <p:spPr>
             <a:xfrm>
               <a:off x="3474720" y="1737360"/>
-              <a:ext cx="3097080" cy="993960"/>
+              <a:ext cx="3096360" cy="993240"/>
             </a:xfrm>
             <a:prstGeom prst="rect">
               <a:avLst/>
@@ -786,7 +786,7 @@
           <p:spPr>
             <a:xfrm>
               <a:off x="4114800" y="2743200"/>
-              <a:ext cx="1451160" cy="993960"/>
+              <a:ext cx="1450440" cy="993240"/>
             </a:xfrm>
             <a:prstGeom prst="rect">
               <a:avLst/>
@@ -833,7 +833,7 @@
           <p:spPr>
             <a:xfrm>
               <a:off x="6583680" y="1463040"/>
-              <a:ext cx="1542600" cy="445320"/>
+              <a:ext cx="1541880" cy="444600"/>
             </a:xfrm>
             <a:prstGeom prst="rect">
               <a:avLst/>
@@ -882,7 +882,7 @@
           <p:spPr>
             <a:xfrm>
               <a:off x="7315200" y="1920240"/>
-              <a:ext cx="1451160" cy="1634040"/>
+              <a:ext cx="1450440" cy="1633320"/>
             </a:xfrm>
             <a:prstGeom prst="rect">
               <a:avLst/>
@@ -931,7 +931,7 @@
           <p:spPr>
             <a:xfrm>
               <a:off x="2743200" y="2377440"/>
-              <a:ext cx="536760" cy="811080"/>
+              <a:ext cx="536040" cy="810360"/>
             </a:xfrm>
             <a:prstGeom prst="rect">
               <a:avLst/>
@@ -978,7 +978,7 @@
           <p:spPr>
             <a:xfrm>
               <a:off x="8595360" y="0"/>
-              <a:ext cx="1473480" cy="1451160"/>
+              <a:ext cx="1472760" cy="1450440"/>
             </a:xfrm>
             <a:prstGeom prst="rect">
               <a:avLst/>
@@ -1025,7 +1025,7 @@
           <p:spPr>
             <a:xfrm>
               <a:off x="6766560" y="0"/>
-              <a:ext cx="262440" cy="993960"/>
+              <a:ext cx="261720" cy="993240"/>
             </a:xfrm>
             <a:prstGeom prst="rect">
               <a:avLst/>
@@ -1074,7 +1074,7 @@
           <p:spPr>
             <a:xfrm>
               <a:off x="1554480" y="0"/>
-              <a:ext cx="171000" cy="902520"/>
+              <a:ext cx="170280" cy="901800"/>
             </a:xfrm>
             <a:prstGeom prst="rect">
               <a:avLst/>
@@ -1121,7 +1121,7 @@
           <p:spPr>
             <a:xfrm>
               <a:off x="0" y="3017520"/>
-              <a:ext cx="353880" cy="1085400"/>
+              <a:ext cx="353160" cy="1084680"/>
             </a:xfrm>
             <a:prstGeom prst="rect">
               <a:avLst/>
@@ -1168,7 +1168,7 @@
           <p:spPr>
             <a:xfrm>
               <a:off x="9601200" y="2560320"/>
-              <a:ext cx="353880" cy="1542600"/>
+              <a:ext cx="353160" cy="1541880"/>
             </a:xfrm>
             <a:prstGeom prst="rect">
               <a:avLst/>
@@ -1215,7 +1215,7 @@
           <p:spPr>
             <a:xfrm>
               <a:off x="8778240" y="1828800"/>
-              <a:ext cx="353880" cy="353880"/>
+              <a:ext cx="353160" cy="353160"/>
             </a:xfrm>
             <a:prstGeom prst="rect">
               <a:avLst/>
@@ -1562,10 +1562,10 @@
         </p:nvGrpSpPr>
         <p:grpSpPr>
           <a:xfrm>
-            <a:off x="8540280" y="5054040"/>
-            <a:ext cx="1268640" cy="902880"/>
-            <a:chOff x="8540280" y="5054040"/>
-            <a:chExt cx="1268640" cy="902880"/>
+            <a:off x="8540280" y="5053320"/>
+            <a:ext cx="1267920" cy="902160"/>
+            <a:chOff x="8540280" y="5053320"/>
+            <a:chExt cx="1267920" cy="902160"/>
           </a:xfrm>
         </p:grpSpPr>
         <p:grpSp>
@@ -1576,10 +1576,10 @@
           </p:nvGrpSpPr>
           <p:grpSpPr>
             <a:xfrm>
-              <a:off x="8540280" y="5054040"/>
-              <a:ext cx="1268640" cy="902880"/>
-              <a:chOff x="8540280" y="5054040"/>
-              <a:chExt cx="1268640" cy="902880"/>
+              <a:off x="8540280" y="5053320"/>
+              <a:ext cx="1267920" cy="902160"/>
+              <a:chOff x="8540280" y="5053320"/>
+              <a:chExt cx="1267920" cy="902160"/>
             </a:xfrm>
           </p:grpSpPr>
           <p:sp>
@@ -1590,8 +1590,8 @@
             </p:nvSpPr>
             <p:spPr>
               <a:xfrm flipV="1" rot="21598800">
-                <a:off x="9637560" y="5419440"/>
-                <a:ext cx="171000" cy="171000"/>
+                <a:off x="9637560" y="5418720"/>
+                <a:ext cx="170280" cy="170280"/>
               </a:xfrm>
               <a:prstGeom prst="ellipse">
                 <a:avLst/>
@@ -1599,7 +1599,7 @@
               <a:blipFill rotWithShape="0">
                 <a:blip r:embed="rId2"/>
                 <a:srcRect/>
-                <a:tile tx="0" ty="0" sx="63120" sy="63120" algn="ctr"/>
+                <a:tile tx="0" ty="0" sx="62411" sy="62411" algn="ctr"/>
               </a:blipFill>
               <a:ln w="0">
                 <a:noFill/>
@@ -1646,8 +1646,8 @@
             </p:nvSpPr>
             <p:spPr>
               <a:xfrm flipV="1" rot="21598800">
-                <a:off x="9271800" y="5419440"/>
-                <a:ext cx="171000" cy="171000"/>
+                <a:off x="9271800" y="5418720"/>
+                <a:ext cx="170280" cy="170280"/>
               </a:xfrm>
               <a:prstGeom prst="ellipse">
                 <a:avLst/>
@@ -1655,7 +1655,7 @@
               <a:blipFill rotWithShape="0">
                 <a:blip r:embed="rId3"/>
                 <a:srcRect/>
-                <a:tile tx="0" ty="0" sx="63120" sy="63120" algn="ctr"/>
+                <a:tile tx="0" ty="0" sx="62411" sy="62411" algn="ctr"/>
               </a:blipFill>
               <a:ln w="0">
                 <a:noFill/>
@@ -1702,8 +1702,8 @@
             </p:nvSpPr>
             <p:spPr>
               <a:xfrm flipV="1" rot="21598800">
-                <a:off x="8906400" y="5419440"/>
-                <a:ext cx="171000" cy="171000"/>
+                <a:off x="8906400" y="5418720"/>
+                <a:ext cx="170280" cy="170280"/>
               </a:xfrm>
               <a:prstGeom prst="ellipse">
                 <a:avLst/>
@@ -1711,7 +1711,7 @@
               <a:blipFill rotWithShape="0">
                 <a:blip r:embed="rId4"/>
                 <a:srcRect/>
-                <a:tile tx="0" ty="0" sx="63120" sy="63120" algn="ctr"/>
+                <a:tile tx="0" ty="0" sx="62411" sy="62411" algn="ctr"/>
               </a:blipFill>
               <a:ln w="0">
                 <a:noFill/>
@@ -1758,8 +1758,8 @@
             </p:nvSpPr>
             <p:spPr>
               <a:xfrm flipV="1" rot="21598800">
-                <a:off x="8540280" y="5419800"/>
-                <a:ext cx="171000" cy="171000"/>
+                <a:off x="8540280" y="5419080"/>
+                <a:ext cx="170280" cy="170280"/>
               </a:xfrm>
               <a:prstGeom prst="ellipse">
                 <a:avLst/>
@@ -1767,7 +1767,7 @@
               <a:blipFill rotWithShape="0">
                 <a:blip r:embed="rId5"/>
                 <a:srcRect/>
-                <a:tile tx="0" ty="0" sx="63120" sy="63120" algn="ctr"/>
+                <a:tile tx="0" ty="0" sx="62411" sy="62411" algn="ctr"/>
               </a:blipFill>
               <a:ln w="0">
                 <a:noFill/>
@@ -1814,8 +1814,8 @@
             </p:nvSpPr>
             <p:spPr>
               <a:xfrm flipV="1" rot="21598800">
-                <a:off x="8540280" y="5053680"/>
-                <a:ext cx="171000" cy="171000"/>
+                <a:off x="8540280" y="5052960"/>
+                <a:ext cx="170280" cy="170280"/>
               </a:xfrm>
               <a:prstGeom prst="ellipse">
                 <a:avLst/>
@@ -1823,7 +1823,7 @@
               <a:blipFill rotWithShape="0">
                 <a:blip r:embed="rId6"/>
                 <a:srcRect/>
-                <a:tile tx="0" ty="0" sx="63120" sy="63120" algn="ctr"/>
+                <a:tile tx="0" ty="0" sx="62411" sy="62411" algn="ctr"/>
               </a:blipFill>
               <a:ln w="0">
                 <a:noFill/>
@@ -1870,8 +1870,8 @@
             </p:nvSpPr>
             <p:spPr>
               <a:xfrm flipV="1" rot="21598800">
-                <a:off x="8906040" y="5053680"/>
-                <a:ext cx="171000" cy="171000"/>
+                <a:off x="8906040" y="5052960"/>
+                <a:ext cx="170280" cy="170280"/>
               </a:xfrm>
               <a:prstGeom prst="ellipse">
                 <a:avLst/>
@@ -1879,7 +1879,7 @@
               <a:blipFill rotWithShape="0">
                 <a:blip r:embed="rId7"/>
                 <a:srcRect/>
-                <a:tile tx="0" ty="0" sx="63120" sy="63120" algn="ctr"/>
+                <a:tile tx="0" ty="0" sx="62411" sy="62411" algn="ctr"/>
               </a:blipFill>
               <a:ln w="0">
                 <a:noFill/>
@@ -1926,8 +1926,8 @@
             </p:nvSpPr>
             <p:spPr>
               <a:xfrm flipV="1" rot="21598800">
-                <a:off x="9271800" y="5054040"/>
-                <a:ext cx="171000" cy="171000"/>
+                <a:off x="9271800" y="5053320"/>
+                <a:ext cx="170280" cy="170280"/>
               </a:xfrm>
               <a:prstGeom prst="ellipse">
                 <a:avLst/>
@@ -1935,7 +1935,7 @@
               <a:blipFill rotWithShape="0">
                 <a:blip r:embed="rId8"/>
                 <a:srcRect/>
-                <a:tile tx="0" ty="0" sx="63120" sy="63120" algn="ctr"/>
+                <a:tile tx="0" ty="0" sx="62411" sy="62411" algn="ctr"/>
               </a:blipFill>
               <a:ln w="0">
                 <a:noFill/>
@@ -1982,8 +1982,8 @@
             </p:nvSpPr>
             <p:spPr>
               <a:xfrm flipV="1" rot="21598800">
-                <a:off x="9637920" y="5053680"/>
-                <a:ext cx="171000" cy="171000"/>
+                <a:off x="9637920" y="5052960"/>
+                <a:ext cx="170280" cy="170280"/>
               </a:xfrm>
               <a:prstGeom prst="ellipse">
                 <a:avLst/>
@@ -1991,7 +1991,7 @@
               <a:blipFill rotWithShape="0">
                 <a:blip r:embed="rId9"/>
                 <a:srcRect/>
-                <a:tile tx="0" ty="0" sx="63120" sy="63120" algn="ctr"/>
+                <a:tile tx="0" ty="0" sx="62411" sy="62411" algn="ctr"/>
               </a:blipFill>
               <a:ln w="0">
                 <a:noFill/>
@@ -2038,8 +2038,8 @@
             </p:nvSpPr>
             <p:spPr>
               <a:xfrm flipV="1" rot="21598800">
-                <a:off x="9637560" y="5785200"/>
-                <a:ext cx="171000" cy="171000"/>
+                <a:off x="9637560" y="5784480"/>
+                <a:ext cx="170280" cy="170280"/>
               </a:xfrm>
               <a:prstGeom prst="ellipse">
                 <a:avLst/>
@@ -2047,7 +2047,7 @@
               <a:blipFill rotWithShape="0">
                 <a:blip r:embed="rId10"/>
                 <a:srcRect/>
-                <a:tile tx="0" ty="0" sx="63120" sy="63120" algn="ctr"/>
+                <a:tile tx="0" ty="0" sx="62411" sy="62411" algn="ctr"/>
               </a:blipFill>
               <a:ln w="0">
                 <a:noFill/>
@@ -2094,8 +2094,8 @@
             </p:nvSpPr>
             <p:spPr>
               <a:xfrm flipV="1" rot="21598800">
-                <a:off x="9272160" y="5785560"/>
-                <a:ext cx="171000" cy="171000"/>
+                <a:off x="9272160" y="5784840"/>
+                <a:ext cx="170280" cy="170280"/>
               </a:xfrm>
               <a:prstGeom prst="ellipse">
                 <a:avLst/>
@@ -2103,7 +2103,7 @@
               <a:blipFill rotWithShape="0">
                 <a:blip r:embed="rId11"/>
                 <a:srcRect/>
-                <a:tile tx="0" ty="0" sx="63120" sy="63120" algn="ctr"/>
+                <a:tile tx="0" ty="0" sx="62411" sy="62411" algn="ctr"/>
               </a:blipFill>
               <a:ln w="0">
                 <a:noFill/>
@@ -2150,8 +2150,8 @@
             </p:nvSpPr>
             <p:spPr>
               <a:xfrm flipV="1" rot="21598800">
-                <a:off x="8906040" y="5785200"/>
-                <a:ext cx="171000" cy="171000"/>
+                <a:off x="8906040" y="5784480"/>
+                <a:ext cx="170280" cy="170280"/>
               </a:xfrm>
               <a:prstGeom prst="ellipse">
                 <a:avLst/>
@@ -2159,7 +2159,7 @@
               <a:blipFill rotWithShape="0">
                 <a:blip r:embed="rId12"/>
                 <a:srcRect/>
-                <a:tile tx="0" ty="0" sx="63120" sy="63120" algn="ctr"/>
+                <a:tile tx="0" ty="0" sx="62411" sy="62411" algn="ctr"/>
               </a:blipFill>
               <a:ln w="0">
                 <a:noFill/>
@@ -2206,8 +2206,8 @@
             </p:nvSpPr>
             <p:spPr>
               <a:xfrm flipV="1" rot="21598800">
-                <a:off x="8540280" y="5785200"/>
-                <a:ext cx="171000" cy="171000"/>
+                <a:off x="8540280" y="5784480"/>
+                <a:ext cx="170280" cy="170280"/>
               </a:xfrm>
               <a:prstGeom prst="ellipse">
                 <a:avLst/>
@@ -2215,7 +2215,7 @@
               <a:blipFill rotWithShape="0">
                 <a:blip r:embed="rId13"/>
                 <a:srcRect/>
-                <a:tile tx="0" ty="0" sx="63120" sy="63120" algn="ctr"/>
+                <a:tile tx="0" ty="0" sx="62411" sy="62411" algn="ctr"/>
               </a:blipFill>
               <a:ln w="0">
                 <a:noFill/>
@@ -2265,7 +2265,7 @@
         <p:spPr>
           <a:xfrm>
             <a:off x="1499760" y="1774080"/>
-            <a:ext cx="2914200" cy="2914200"/>
+            <a:ext cx="2913480" cy="2913480"/>
           </a:xfrm>
           <a:prstGeom prst="ellipse">
             <a:avLst/>
@@ -2314,7 +2314,7 @@
         <p:spPr>
           <a:xfrm>
             <a:off x="1225080" y="1134360"/>
-            <a:ext cx="1177200" cy="1176480"/>
+            <a:ext cx="1176480" cy="1175760"/>
           </a:xfrm>
           <a:prstGeom prst="ellipse">
             <a:avLst/>
@@ -2363,7 +2363,7 @@
         <p:spPr>
           <a:xfrm>
             <a:off x="3420000" y="4242960"/>
-            <a:ext cx="628200" cy="628200"/>
+            <a:ext cx="627480" cy="627480"/>
           </a:xfrm>
           <a:prstGeom prst="ellipse">
             <a:avLst/>
@@ -2416,7 +2416,7 @@
         <p:spPr>
           <a:xfrm>
             <a:off x="4349520" y="792360"/>
-            <a:ext cx="5514120" cy="4133520"/>
+            <a:ext cx="5513400" cy="4132800"/>
           </a:xfrm>
           <a:prstGeom prst="rect">
             <a:avLst/>
@@ -2435,7 +2435,7 @@
         <p:spPr>
           <a:xfrm>
             <a:off x="4846320" y="4846320"/>
-            <a:ext cx="2121120" cy="230760"/>
+            <a:ext cx="2120400" cy="230040"/>
           </a:xfrm>
           <a:prstGeom prst="rect">
             <a:avLst/>
@@ -2555,9 +2555,9 @@
         <p:grpSpPr>
           <a:xfrm>
             <a:off x="7406640" y="3566160"/>
-            <a:ext cx="2365560" cy="4285800"/>
+            <a:ext cx="2364840" cy="4285080"/>
             <a:chOff x="7406640" y="3566160"/>
-            <a:chExt cx="2365560" cy="4285800"/>
+            <a:chExt cx="2364840" cy="4285080"/>
           </a:xfrm>
         </p:grpSpPr>
         <p:sp>
@@ -2569,7 +2569,7 @@
           <p:spPr>
             <a:xfrm>
               <a:off x="8138160" y="4754880"/>
-              <a:ext cx="445320" cy="2548440"/>
+              <a:ext cx="444600" cy="2547720"/>
             </a:xfrm>
             <a:prstGeom prst="rect">
               <a:avLst/>
@@ -2577,7 +2577,7 @@
             <a:blipFill rotWithShape="0">
               <a:blip r:embed="rId2"/>
               <a:srcRect/>
-              <a:tile tx="0" ty="0" sx="63120" sy="63120" algn="ctr"/>
+              <a:tile tx="0" ty="0" sx="62411" sy="62411" algn="ctr"/>
             </a:blipFill>
             <a:ln w="0">
               <a:noFill/>
@@ -2618,7 +2618,7 @@
           <p:spPr>
             <a:xfrm>
               <a:off x="8961120" y="3566160"/>
-              <a:ext cx="445320" cy="2548440"/>
+              <a:ext cx="444600" cy="2547720"/>
             </a:xfrm>
             <a:prstGeom prst="rect">
               <a:avLst/>
@@ -2626,7 +2626,7 @@
             <a:blipFill rotWithShape="0">
               <a:blip r:embed="rId3"/>
               <a:srcRect/>
-              <a:tile tx="0" ty="0" sx="63120" sy="63120" algn="ctr"/>
+              <a:tile tx="0" ty="0" sx="62411" sy="62411" algn="ctr"/>
             </a:blipFill>
             <a:ln w="0">
               <a:noFill/>
@@ -2667,7 +2667,7 @@
           <p:spPr>
             <a:xfrm>
               <a:off x="8503920" y="5120640"/>
-              <a:ext cx="1268280" cy="79560"/>
+              <a:ext cx="1267560" cy="78840"/>
             </a:xfrm>
             <a:prstGeom prst="rect">
               <a:avLst/>
@@ -2688,7 +2688,7 @@
             <a:fontRef idx="minor"/>
           </p:style>
           <p:txBody>
-            <a:bodyPr wrap="none" lIns="90000" rIns="90000" tIns="39960" bIns="39960" anchor="ctr">
+            <a:bodyPr wrap="none" lIns="90000" rIns="90000" tIns="39600" bIns="39600" anchor="ctr">
               <a:noAutofit/>
             </a:bodyPr>
             <a:p>
@@ -2716,7 +2716,7 @@
           <p:spPr>
             <a:xfrm>
               <a:off x="8321040" y="5303520"/>
-              <a:ext cx="902520" cy="79560"/>
+              <a:ext cx="901800" cy="78840"/>
             </a:xfrm>
             <a:prstGeom prst="rect">
               <a:avLst/>
@@ -2737,7 +2737,7 @@
             <a:fontRef idx="minor"/>
           </p:style>
           <p:txBody>
-            <a:bodyPr wrap="none" lIns="90000" rIns="90000" tIns="39960" bIns="39960" anchor="ctr">
+            <a:bodyPr wrap="none" lIns="90000" rIns="90000" tIns="39600" bIns="39600" anchor="ctr">
               <a:noAutofit/>
             </a:bodyPr>
             <a:p>
@@ -2765,7 +2765,7 @@
           <p:spPr>
             <a:xfrm>
               <a:off x="8869680" y="5486400"/>
-              <a:ext cx="902520" cy="79560"/>
+              <a:ext cx="901800" cy="78840"/>
             </a:xfrm>
             <a:prstGeom prst="rect">
               <a:avLst/>
@@ -2786,7 +2786,7 @@
             <a:fontRef idx="minor"/>
           </p:style>
           <p:txBody>
-            <a:bodyPr wrap="none" lIns="90000" rIns="90000" tIns="39960" bIns="39960" anchor="ctr">
+            <a:bodyPr wrap="none" lIns="90000" rIns="90000" tIns="39600" bIns="39600" anchor="ctr">
               <a:noAutofit/>
             </a:bodyPr>
             <a:p>
@@ -2814,7 +2814,7 @@
           <p:spPr>
             <a:xfrm>
               <a:off x="7406640" y="5303520"/>
-              <a:ext cx="445320" cy="2548440"/>
+              <a:ext cx="444600" cy="2547720"/>
             </a:xfrm>
             <a:prstGeom prst="rect">
               <a:avLst/>
@@ -2822,7 +2822,7 @@
             <a:blipFill rotWithShape="0">
               <a:blip r:embed="rId4"/>
               <a:srcRect/>
-              <a:tile tx="0" ty="0" sx="63120" sy="63120" algn="ctr"/>
+              <a:tile tx="0" ty="0" sx="62411" sy="62411" algn="ctr"/>
             </a:blipFill>
             <a:ln w="0">
               <a:noFill/>
@@ -2863,8 +2863,8 @@
         </p:nvSpPr>
         <p:spPr>
           <a:xfrm flipH="1" flipV="1">
-            <a:off x="1438560" y="-1566720"/>
-            <a:ext cx="445320" cy="2548440"/>
+            <a:off x="1437120" y="-1567440"/>
+            <a:ext cx="444600" cy="2547720"/>
           </a:xfrm>
           <a:prstGeom prst="rect">
             <a:avLst/>
@@ -2872,7 +2872,7 @@
           <a:blipFill rotWithShape="0">
             <a:blip r:embed="rId5"/>
             <a:srcRect/>
-            <a:tile tx="0" ty="0" sx="63120" sy="63120" algn="ctr"/>
+            <a:tile tx="0" ty="0" sx="62411" sy="62411" algn="ctr"/>
           </a:blipFill>
           <a:ln w="0">
             <a:noFill/>
@@ -2912,8 +2912,8 @@
         </p:nvSpPr>
         <p:spPr>
           <a:xfrm flipH="1" flipV="1">
-            <a:off x="615600" y="-365760"/>
-            <a:ext cx="445320" cy="2548440"/>
+            <a:off x="614160" y="-365760"/>
+            <a:ext cx="444600" cy="2547720"/>
           </a:xfrm>
           <a:prstGeom prst="rect">
             <a:avLst/>
@@ -2921,7 +2921,7 @@
           <a:blipFill rotWithShape="0">
             <a:blip r:embed="rId6"/>
             <a:srcRect/>
-            <a:tile tx="0" ty="0" sx="63120" sy="63120" algn="ctr"/>
+            <a:tile tx="0" ty="0" sx="62411" sy="62411" algn="ctr"/>
           </a:blipFill>
           <a:ln w="0">
             <a:noFill/>
@@ -2961,8 +2961,8 @@
         </p:nvSpPr>
         <p:spPr>
           <a:xfrm flipH="1" flipV="1">
-            <a:off x="262080" y="536400"/>
-            <a:ext cx="1268280" cy="79560"/>
+            <a:off x="261360" y="535680"/>
+            <a:ext cx="1267560" cy="78840"/>
           </a:xfrm>
           <a:prstGeom prst="rect">
             <a:avLst/>
@@ -2983,7 +2983,7 @@
           <a:fontRef idx="minor"/>
         </p:style>
         <p:txBody>
-          <a:bodyPr wrap="none" lIns="90000" rIns="90000" tIns="39960" bIns="39960" anchor="ctr">
+          <a:bodyPr wrap="none" lIns="90000" rIns="90000" tIns="39600" bIns="39600" anchor="ctr">
             <a:noAutofit/>
           </a:bodyPr>
           <a:p>
@@ -3010,8 +3010,8 @@
         </p:nvSpPr>
         <p:spPr>
           <a:xfrm flipH="1" flipV="1">
-            <a:off x="810720" y="353520"/>
-            <a:ext cx="902520" cy="79560"/>
+            <a:off x="810000" y="352800"/>
+            <a:ext cx="901800" cy="78840"/>
           </a:xfrm>
           <a:prstGeom prst="rect">
             <a:avLst/>
@@ -3032,7 +3032,7 @@
           <a:fontRef idx="minor"/>
         </p:style>
         <p:txBody>
-          <a:bodyPr wrap="none" lIns="90000" rIns="90000" tIns="39960" bIns="39960" anchor="ctr">
+          <a:bodyPr wrap="none" lIns="90000" rIns="90000" tIns="39600" bIns="39600" anchor="ctr">
             <a:noAutofit/>
           </a:bodyPr>
           <a:p>
@@ -3059,8 +3059,8 @@
         </p:nvSpPr>
         <p:spPr>
           <a:xfrm flipH="1" flipV="1">
-            <a:off x="262080" y="170640"/>
-            <a:ext cx="902520" cy="79560"/>
+            <a:off x="261360" y="169920"/>
+            <a:ext cx="901800" cy="78840"/>
           </a:xfrm>
           <a:prstGeom prst="rect">
             <a:avLst/>
@@ -3081,7 +3081,7 @@
           <a:fontRef idx="minor"/>
         </p:style>
         <p:txBody>
-          <a:bodyPr wrap="none" lIns="90000" rIns="90000" tIns="39960" bIns="39960" anchor="ctr">
+          <a:bodyPr wrap="none" lIns="90000" rIns="90000" tIns="39600" bIns="39600" anchor="ctr">
             <a:noAutofit/>
           </a:bodyPr>
           <a:p>
@@ -3108,8 +3108,8 @@
         </p:nvSpPr>
         <p:spPr>
           <a:xfrm flipH="1" flipV="1">
-            <a:off x="2182320" y="-2115360"/>
-            <a:ext cx="445320" cy="2548440"/>
+            <a:off x="2181600" y="-2116080"/>
+            <a:ext cx="444600" cy="2547720"/>
           </a:xfrm>
           <a:prstGeom prst="rect">
             <a:avLst/>
@@ -3117,7 +3117,7 @@
           <a:blipFill rotWithShape="0">
             <a:blip r:embed="rId7"/>
             <a:srcRect/>
-            <a:tile tx="0" ty="0" sx="63120" sy="63120" algn="ctr"/>
+            <a:tile tx="0" ty="0" sx="62411" sy="62411" algn="ctr"/>
           </a:blipFill>
           <a:ln w="0">
             <a:noFill/>
@@ -3158,7 +3158,7 @@
         <p:spPr>
           <a:xfrm>
             <a:off x="3474720" y="2560320"/>
-            <a:ext cx="2731320" cy="2731320"/>
+            <a:ext cx="2730600" cy="2730600"/>
           </a:xfrm>
           <a:prstGeom prst="ellipse">
             <a:avLst/>
@@ -3507,7 +3507,7 @@
         <p:spPr>
           <a:xfrm>
             <a:off x="822960" y="2468880"/>
-            <a:ext cx="1451160" cy="1451160"/>
+            <a:ext cx="1450440" cy="1450440"/>
           </a:xfrm>
           <a:prstGeom prst="ellipse">
             <a:avLst/>
@@ -3561,7 +3561,7 @@
         <p:spPr>
           <a:xfrm>
             <a:off x="4480560" y="1554480"/>
-            <a:ext cx="1451160" cy="1451160"/>
+            <a:ext cx="1450440" cy="1450440"/>
           </a:xfrm>
           <a:prstGeom prst="ellipse">
             <a:avLst/>
@@ -3615,7 +3615,7 @@
         <p:spPr>
           <a:xfrm>
             <a:off x="6583680" y="3108960"/>
-            <a:ext cx="1451160" cy="1451160"/>
+            <a:ext cx="1450440" cy="1450440"/>
           </a:xfrm>
           <a:prstGeom prst="ellipse">
             <a:avLst/>
@@ -3669,15 +3669,15 @@
         <p:spPr>
           <a:xfrm>
             <a:off x="1554480" y="4114800"/>
-            <a:ext cx="902520" cy="645480"/>
+            <a:ext cx="901800" cy="644760"/>
           </a:xfrm>
           <a:custGeom>
             <a:avLst/>
             <a:gdLst>
-              <a:gd name="textAreaLeft" fmla="*/ 0 w 902520"/>
-              <a:gd name="textAreaRight" fmla="*/ 914400 w 902520"/>
-              <a:gd name="textAreaTop" fmla="*/ 0 h 645480"/>
-              <a:gd name="textAreaBottom" fmla="*/ 657360 h 645480"/>
+              <a:gd name="textAreaLeft" fmla="*/ 0 w 901800"/>
+              <a:gd name="textAreaRight" fmla="*/ 914400 w 901800"/>
+              <a:gd name="textAreaTop" fmla="*/ 0 h 644760"/>
+              <a:gd name="textAreaBottom" fmla="*/ 657360 h 644760"/>
             </a:gdLst>
             <a:ahLst/>
             <a:rect l="textAreaLeft" t="textAreaTop" r="textAreaRight" b="textAreaBottom"/>
@@ -3740,15 +3740,15 @@
         <p:spPr>
           <a:xfrm>
             <a:off x="3657600" y="1188720"/>
-            <a:ext cx="811080" cy="628200"/>
+            <a:ext cx="810360" cy="627480"/>
           </a:xfrm>
           <a:custGeom>
             <a:avLst/>
             <a:gdLst>
-              <a:gd name="textAreaLeft" fmla="*/ 0 w 811080"/>
-              <a:gd name="textAreaRight" fmla="*/ 822960 w 811080"/>
-              <a:gd name="textAreaTop" fmla="*/ 0 h 628200"/>
-              <a:gd name="textAreaBottom" fmla="*/ 640080 h 628200"/>
+              <a:gd name="textAreaLeft" fmla="*/ 0 w 810360"/>
+              <a:gd name="textAreaRight" fmla="*/ 822960 w 810360"/>
+              <a:gd name="textAreaTop" fmla="*/ 0 h 627480"/>
+              <a:gd name="textAreaBottom" fmla="*/ 640080 h 627480"/>
             </a:gdLst>
             <a:ahLst/>
             <a:rect l="textAreaLeft" t="textAreaTop" r="textAreaRight" b="textAreaBottom"/>
@@ -3811,15 +3811,15 @@
         <p:spPr>
           <a:xfrm>
             <a:off x="7955280" y="2011680"/>
-            <a:ext cx="1452240" cy="1176840"/>
+            <a:ext cx="1451520" cy="1176120"/>
           </a:xfrm>
           <a:custGeom>
             <a:avLst/>
             <a:gdLst>
-              <a:gd name="textAreaLeft" fmla="*/ 0 w 1452240"/>
-              <a:gd name="textAreaRight" fmla="*/ 1464120 w 1452240"/>
-              <a:gd name="textAreaTop" fmla="*/ 0 h 1176840"/>
-              <a:gd name="textAreaBottom" fmla="*/ 1188720 h 1176840"/>
+              <a:gd name="textAreaLeft" fmla="*/ 0 w 1451520"/>
+              <a:gd name="textAreaRight" fmla="*/ 1464120 w 1451520"/>
+              <a:gd name="textAreaTop" fmla="*/ 0 h 1176120"/>
+              <a:gd name="textAreaBottom" fmla="*/ 1188720 h 1176120"/>
             </a:gdLst>
             <a:ahLst/>
             <a:rect l="textAreaLeft" t="textAreaTop" r="textAreaRight" b="textAreaBottom"/>
@@ -3887,7 +3887,7 @@
         <p:spPr>
           <a:xfrm>
             <a:off x="2468880" y="822960"/>
-            <a:ext cx="1398600" cy="1359720"/>
+            <a:ext cx="1397880" cy="1359000"/>
           </a:xfrm>
           <a:prstGeom prst="ellipse">
             <a:avLst/>
@@ -3936,7 +3936,7 @@
         <p:spPr>
           <a:xfrm>
             <a:off x="3931920" y="4663440"/>
-            <a:ext cx="1672920" cy="1634040"/>
+            <a:ext cx="1672200" cy="1633320"/>
           </a:xfrm>
           <a:prstGeom prst="ellipse">
             <a:avLst/>
@@ -3985,7 +3985,7 @@
         <p:spPr>
           <a:xfrm>
             <a:off x="8412480" y="1280160"/>
-            <a:ext cx="1085400" cy="993960"/>
+            <a:ext cx="1084680" cy="993240"/>
           </a:xfrm>
           <a:prstGeom prst="ellipse">
             <a:avLst/>
@@ -4060,7 +4060,7 @@
         <p:spPr>
           <a:xfrm>
             <a:off x="2103480" y="3658320"/>
-            <a:ext cx="1634040" cy="1634040"/>
+            <a:ext cx="1633320" cy="1633320"/>
           </a:xfrm>
           <a:prstGeom prst="ellipse">
             <a:avLst/>
@@ -4109,7 +4109,7 @@
         <p:spPr>
           <a:xfrm>
             <a:off x="823320" y="-273240"/>
-            <a:ext cx="2182680" cy="2182680"/>
+            <a:ext cx="2181960" cy="2181960"/>
           </a:xfrm>
           <a:prstGeom prst="ellipse">
             <a:avLst/>
@@ -4158,7 +4158,7 @@
         <p:spPr>
           <a:xfrm>
             <a:off x="7955640" y="3109680"/>
-            <a:ext cx="2182680" cy="2182680"/>
+            <a:ext cx="2181960" cy="2181960"/>
           </a:xfrm>
           <a:prstGeom prst="ellipse">
             <a:avLst/>
@@ -4207,7 +4207,7 @@
         <p:spPr>
           <a:xfrm>
             <a:off x="9601560" y="915120"/>
-            <a:ext cx="1634040" cy="1634040"/>
+            <a:ext cx="1633320" cy="1633320"/>
           </a:xfrm>
           <a:prstGeom prst="ellipse">
             <a:avLst/>
@@ -4255,10 +4255,10 @@
         </p:nvGrpSpPr>
         <p:grpSpPr>
           <a:xfrm>
-            <a:off x="3909960" y="752040"/>
-            <a:ext cx="2424600" cy="4326840"/>
-            <a:chOff x="3909960" y="752040"/>
-            <a:chExt cx="2424600" cy="4326840"/>
+            <a:off x="3909240" y="751320"/>
+            <a:ext cx="2423880" cy="4326120"/>
+            <a:chOff x="3909240" y="751320"/>
+            <a:chExt cx="2423880" cy="4326120"/>
           </a:xfrm>
         </p:grpSpPr>
         <p:sp>
@@ -4269,8 +4269,8 @@
           </p:nvSpPr>
           <p:spPr>
             <a:xfrm flipH="1" flipV="1" rot="5330400">
-              <a:off x="4846680" y="3352680"/>
-              <a:ext cx="1359720" cy="1454400"/>
+              <a:off x="4845960" y="3351960"/>
+              <a:ext cx="1359000" cy="1453680"/>
             </a:xfrm>
             <a:prstGeom prst="parallelogram">
               <a:avLst>
@@ -4318,8 +4318,8 @@
           </p:nvSpPr>
           <p:spPr>
             <a:xfrm flipH="1" flipV="1" rot="5330400">
-              <a:off x="4016160" y="2314440"/>
-              <a:ext cx="1359720" cy="1454400"/>
+              <a:off x="4015440" y="2313720"/>
+              <a:ext cx="1359000" cy="1453680"/>
             </a:xfrm>
             <a:prstGeom prst="parallelogram">
               <a:avLst>
@@ -4367,8 +4367,8 @@
           </p:nvSpPr>
           <p:spPr>
             <a:xfrm flipH="1" flipV="1" rot="5330400">
-              <a:off x="4913280" y="2050200"/>
-              <a:ext cx="1359720" cy="1454400"/>
+              <a:off x="4912560" y="2049480"/>
+              <a:ext cx="1359000" cy="1453680"/>
             </a:xfrm>
             <a:prstGeom prst="parallelogram">
               <a:avLst>
@@ -4416,8 +4416,8 @@
           </p:nvSpPr>
           <p:spPr>
             <a:xfrm flipH="1" flipV="1" rot="5330400">
-              <a:off x="3970080" y="956520"/>
-              <a:ext cx="1359720" cy="1454400"/>
+              <a:off x="3969360" y="955800"/>
+              <a:ext cx="1359000" cy="1453680"/>
             </a:xfrm>
             <a:prstGeom prst="parallelogram">
               <a:avLst>
@@ -4465,8 +4465,8 @@
           </p:nvSpPr>
           <p:spPr>
             <a:xfrm flipH="1" flipV="1" rot="5330400">
-              <a:off x="4904280" y="718560"/>
-              <a:ext cx="1359720" cy="1454400"/>
+              <a:off x="4903560" y="717840"/>
+              <a:ext cx="1359000" cy="1453680"/>
             </a:xfrm>
             <a:prstGeom prst="parallelogram">
               <a:avLst>
@@ -4514,8 +4514,8 @@
           </p:nvSpPr>
           <p:spPr>
             <a:xfrm flipH="1" flipV="1" rot="5330400">
-              <a:off x="4024800" y="3656880"/>
-              <a:ext cx="1359720" cy="1454400"/>
+              <a:off x="4024080" y="3656160"/>
+              <a:ext cx="1359000" cy="1453680"/>
             </a:xfrm>
             <a:prstGeom prst="parallelogram">
               <a:avLst>
@@ -4591,7 +4591,7 @@
         <p:spPr>
           <a:xfrm>
             <a:off x="6411960" y="1300320"/>
-            <a:ext cx="849960" cy="171000"/>
+            <a:ext cx="849240" cy="170280"/>
           </a:xfrm>
           <a:prstGeom prst="rect">
             <a:avLst/>
@@ -4645,7 +4645,7 @@
         <p:spPr>
           <a:xfrm>
             <a:off x="5813280" y="3854880"/>
-            <a:ext cx="849960" cy="171000"/>
+            <a:ext cx="849240" cy="170280"/>
           </a:xfrm>
           <a:prstGeom prst="rect">
             <a:avLst/>
@@ -4699,7 +4699,7 @@
         <p:spPr>
           <a:xfrm>
             <a:off x="7589520" y="2560320"/>
-            <a:ext cx="2182680" cy="2182680"/>
+            <a:ext cx="2181960" cy="2181960"/>
           </a:xfrm>
           <a:prstGeom prst="ellipse">
             <a:avLst/>
@@ -4748,7 +4748,7 @@
         <p:spPr>
           <a:xfrm>
             <a:off x="3200400" y="731520"/>
-            <a:ext cx="1672920" cy="1634040"/>
+            <a:ext cx="1672200" cy="1633320"/>
           </a:xfrm>
           <a:prstGeom prst="ellipse">
             <a:avLst/>
@@ -4797,7 +4797,7 @@
         <p:spPr>
           <a:xfrm>
             <a:off x="1424160" y="3489120"/>
-            <a:ext cx="1672920" cy="1634040"/>
+            <a:ext cx="1672200" cy="1633320"/>
           </a:xfrm>
           <a:prstGeom prst="ellipse">
             <a:avLst/>
@@ -4846,15 +4846,15 @@
         <p:spPr>
           <a:xfrm>
             <a:off x="700920" y="1900080"/>
-            <a:ext cx="1390320" cy="1837080"/>
+            <a:ext cx="1389600" cy="1836360"/>
           </a:xfrm>
           <a:custGeom>
             <a:avLst/>
             <a:gdLst>
-              <a:gd name="textAreaLeft" fmla="*/ 0 w 1390320"/>
-              <a:gd name="textAreaRight" fmla="*/ 1402200 w 1390320"/>
-              <a:gd name="textAreaTop" fmla="*/ 0 h 1837080"/>
-              <a:gd name="textAreaBottom" fmla="*/ 1848960 h 1837080"/>
+              <a:gd name="textAreaLeft" fmla="*/ 0 w 1389600"/>
+              <a:gd name="textAreaRight" fmla="*/ 1402200 w 1389600"/>
+              <a:gd name="textAreaTop" fmla="*/ 0 h 1836360"/>
+              <a:gd name="textAreaBottom" fmla="*/ 1848960 h 1836360"/>
             </a:gdLst>
             <a:ahLst/>
             <a:rect l="textAreaLeft" t="textAreaTop" r="textAreaRight" b="textAreaBottom"/>
@@ -4919,15 +4919,15 @@
         <p:spPr>
           <a:xfrm>
             <a:off x="3931920" y="2011680"/>
-            <a:ext cx="964080" cy="1359720"/>
+            <a:ext cx="963360" cy="1359000"/>
           </a:xfrm>
           <a:custGeom>
             <a:avLst/>
             <a:gdLst>
-              <a:gd name="textAreaLeft" fmla="*/ 0 w 964080"/>
-              <a:gd name="textAreaRight" fmla="*/ 975960 w 964080"/>
-              <a:gd name="textAreaTop" fmla="*/ 0 h 1359720"/>
-              <a:gd name="textAreaBottom" fmla="*/ 1371600 h 1359720"/>
+              <a:gd name="textAreaLeft" fmla="*/ 0 w 963360"/>
+              <a:gd name="textAreaRight" fmla="*/ 975960 w 963360"/>
+              <a:gd name="textAreaTop" fmla="*/ 0 h 1359000"/>
+              <a:gd name="textAreaBottom" fmla="*/ 1371600 h 1359000"/>
             </a:gdLst>
             <a:ahLst/>
             <a:rect l="textAreaLeft" t="textAreaTop" r="textAreaRight" b="textAreaBottom"/>
@@ -5002,15 +5002,15 @@
         <p:spPr>
           <a:xfrm>
             <a:off x="7724880" y="2103120"/>
-            <a:ext cx="767160" cy="1451160"/>
+            <a:ext cx="766440" cy="1450440"/>
           </a:xfrm>
           <a:custGeom>
             <a:avLst/>
             <a:gdLst>
-              <a:gd name="textAreaLeft" fmla="*/ 0 w 767160"/>
-              <a:gd name="textAreaRight" fmla="*/ 779040 w 767160"/>
-              <a:gd name="textAreaTop" fmla="*/ 0 h 1451160"/>
-              <a:gd name="textAreaBottom" fmla="*/ 1463040 h 1451160"/>
+              <a:gd name="textAreaLeft" fmla="*/ 0 w 766440"/>
+              <a:gd name="textAreaRight" fmla="*/ 779040 w 766440"/>
+              <a:gd name="textAreaTop" fmla="*/ 0 h 1450440"/>
+              <a:gd name="textAreaBottom" fmla="*/ 1463040 h 1450440"/>
             </a:gdLst>
             <a:ahLst/>
             <a:rect l="textAreaLeft" t="textAreaTop" r="textAreaRight" b="textAreaBottom"/>
@@ -5085,7 +5085,7 @@
         <p:spPr>
           <a:xfrm>
             <a:off x="1424160" y="4754880"/>
-            <a:ext cx="849960" cy="171000"/>
+            <a:ext cx="849240" cy="170280"/>
           </a:xfrm>
           <a:prstGeom prst="rect">
             <a:avLst/>
@@ -5139,7 +5139,7 @@
         <p:spPr>
           <a:xfrm>
             <a:off x="2887200" y="1300320"/>
-            <a:ext cx="849960" cy="171000"/>
+            <a:ext cx="849240" cy="170280"/>
           </a:xfrm>
           <a:prstGeom prst="rect">
             <a:avLst/>
@@ -5219,9 +5219,9 @@
         <p:grpSpPr>
           <a:xfrm>
             <a:off x="3570480" y="1225440"/>
-            <a:ext cx="5108760" cy="2914200"/>
+            <a:ext cx="5108040" cy="2913480"/>
             <a:chOff x="3570480" y="1225440"/>
-            <a:chExt cx="5108760" cy="2914200"/>
+            <a:chExt cx="5108040" cy="2913480"/>
           </a:xfrm>
         </p:grpSpPr>
         <p:sp>
@@ -5233,7 +5233,7 @@
           <p:spPr>
             <a:xfrm>
               <a:off x="3570480" y="1528200"/>
-              <a:ext cx="4915440" cy="2611440"/>
+              <a:ext cx="4914720" cy="2610720"/>
             </a:xfrm>
             <a:prstGeom prst="rect">
               <a:avLst/>
@@ -5280,7 +5280,7 @@
           <p:spPr>
             <a:xfrm>
               <a:off x="3763800" y="1225440"/>
-              <a:ext cx="4915440" cy="2611440"/>
+              <a:ext cx="4914720" cy="2610720"/>
             </a:xfrm>
             <a:prstGeom prst="rect">
               <a:avLst/>
@@ -5328,10 +5328,10 @@
         </p:nvGrpSpPr>
         <p:grpSpPr>
           <a:xfrm>
-            <a:off x="-2070360" y="-402120"/>
-            <a:ext cx="4911120" cy="8509320"/>
-            <a:chOff x="-2070360" y="-402120"/>
-            <a:chExt cx="4911120" cy="8509320"/>
+            <a:off x="-2068920" y="-402120"/>
+            <a:ext cx="4908960" cy="8508600"/>
+            <a:chOff x="-2068920" y="-402120"/>
+            <a:chExt cx="4908960" cy="8508600"/>
           </a:xfrm>
         </p:grpSpPr>
         <p:sp>
@@ -5343,15 +5343,15 @@
           <p:spPr>
             <a:xfrm>
               <a:off x="-893160" y="4486680"/>
-              <a:ext cx="1061280" cy="754560"/>
+              <a:ext cx="1060560" cy="753840"/>
             </a:xfrm>
             <a:custGeom>
               <a:avLst/>
               <a:gdLst>
-                <a:gd name="textAreaLeft" fmla="*/ 278280 w 1061280"/>
-                <a:gd name="textAreaRight" fmla="*/ 794880 w 1061280"/>
-                <a:gd name="textAreaTop" fmla="*/ 258840 h 754560"/>
-                <a:gd name="textAreaBottom" fmla="*/ 507600 h 754560"/>
+                <a:gd name="textAreaLeft" fmla="*/ 278280 w 1060560"/>
+                <a:gd name="textAreaRight" fmla="*/ 794880 w 1060560"/>
+                <a:gd name="textAreaTop" fmla="*/ 258840 h 753840"/>
+                <a:gd name="textAreaBottom" fmla="*/ 507600 h 753840"/>
               </a:gdLst>
               <a:ahLst/>
               <a:rect l="textAreaLeft" t="textAreaTop" r="textAreaRight" b="textAreaBottom"/>
@@ -5746,16 +5746,16 @@
           </p:nvSpPr>
           <p:spPr>
             <a:xfrm rot="5358000">
-              <a:off x="-873720" y="5141520"/>
-              <a:ext cx="1056960" cy="754560"/>
+              <a:off x="-872280" y="5140800"/>
+              <a:ext cx="1056240" cy="753840"/>
             </a:xfrm>
             <a:custGeom>
               <a:avLst/>
               <a:gdLst>
-                <a:gd name="textAreaLeft" fmla="*/ 277200 w 1056960"/>
-                <a:gd name="textAreaRight" fmla="*/ 792000 w 1056960"/>
-                <a:gd name="textAreaTop" fmla="*/ 258840 h 754560"/>
-                <a:gd name="textAreaBottom" fmla="*/ 507600 h 754560"/>
+                <a:gd name="textAreaLeft" fmla="*/ 277200 w 1056240"/>
+                <a:gd name="textAreaRight" fmla="*/ 792000 w 1056240"/>
+                <a:gd name="textAreaTop" fmla="*/ 258840 h 753840"/>
+                <a:gd name="textAreaBottom" fmla="*/ 507600 h 753840"/>
               </a:gdLst>
               <a:ahLst/>
               <a:rect l="textAreaLeft" t="textAreaTop" r="textAreaRight" b="textAreaBottom"/>
@@ -6151,15 +6151,15 @@
           <p:spPr>
             <a:xfrm>
               <a:off x="-228960" y="5161680"/>
-              <a:ext cx="1061280" cy="754560"/>
+              <a:ext cx="1060560" cy="753840"/>
             </a:xfrm>
             <a:custGeom>
               <a:avLst/>
               <a:gdLst>
-                <a:gd name="textAreaLeft" fmla="*/ 278280 w 1061280"/>
-                <a:gd name="textAreaRight" fmla="*/ 794880 w 1061280"/>
-                <a:gd name="textAreaTop" fmla="*/ 258840 h 754560"/>
-                <a:gd name="textAreaBottom" fmla="*/ 507600 h 754560"/>
+                <a:gd name="textAreaLeft" fmla="*/ 278280 w 1060560"/>
+                <a:gd name="textAreaRight" fmla="*/ 794880 w 1060560"/>
+                <a:gd name="textAreaTop" fmla="*/ 258840 h 753840"/>
+                <a:gd name="textAreaBottom" fmla="*/ 507600 h 753840"/>
               </a:gdLst>
               <a:ahLst/>
               <a:rect l="textAreaLeft" t="textAreaTop" r="textAreaRight" b="textAreaBottom"/>
@@ -6554,16 +6554,16 @@
           </p:nvSpPr>
           <p:spPr>
             <a:xfrm rot="5358000">
-              <a:off x="-208080" y="4488840"/>
-              <a:ext cx="1056600" cy="754560"/>
+              <a:off x="-207360" y="4488840"/>
+              <a:ext cx="1055880" cy="753840"/>
             </a:xfrm>
             <a:custGeom>
               <a:avLst/>
               <a:gdLst>
-                <a:gd name="textAreaLeft" fmla="*/ 276840 w 1056600"/>
-                <a:gd name="textAreaRight" fmla="*/ 791640 w 1056600"/>
-                <a:gd name="textAreaTop" fmla="*/ 258840 h 754560"/>
-                <a:gd name="textAreaBottom" fmla="*/ 507600 h 754560"/>
+                <a:gd name="textAreaLeft" fmla="*/ 276840 w 1055880"/>
+                <a:gd name="textAreaRight" fmla="*/ 791640 w 1055880"/>
+                <a:gd name="textAreaTop" fmla="*/ 258840 h 753840"/>
+                <a:gd name="textAreaBottom" fmla="*/ 507600 h 753840"/>
               </a:gdLst>
               <a:ahLst/>
               <a:rect l="textAreaLeft" t="textAreaTop" r="textAreaRight" b="textAreaBottom"/>
@@ -6959,15 +6959,15 @@
           <p:spPr>
             <a:xfrm>
               <a:off x="-228960" y="3826080"/>
-              <a:ext cx="1061280" cy="754560"/>
+              <a:ext cx="1060560" cy="753840"/>
             </a:xfrm>
             <a:custGeom>
               <a:avLst/>
               <a:gdLst>
-                <a:gd name="textAreaLeft" fmla="*/ 278280 w 1061280"/>
-                <a:gd name="textAreaRight" fmla="*/ 794880 w 1061280"/>
-                <a:gd name="textAreaTop" fmla="*/ 258840 h 754560"/>
-                <a:gd name="textAreaBottom" fmla="*/ 507600 h 754560"/>
+                <a:gd name="textAreaLeft" fmla="*/ 278280 w 1060560"/>
+                <a:gd name="textAreaRight" fmla="*/ 794880 w 1060560"/>
+                <a:gd name="textAreaTop" fmla="*/ 258840 h 753840"/>
+                <a:gd name="textAreaBottom" fmla="*/ 507600 h 753840"/>
               </a:gdLst>
               <a:ahLst/>
               <a:rect l="textAreaLeft" t="textAreaTop" r="textAreaRight" b="textAreaBottom"/>
@@ -7315,7 +7315,7 @@
             <a:blipFill rotWithShape="0">
               <a:blip r:embed="rId2"/>
               <a:srcRect/>
-              <a:tile tx="0" ty="0" sx="63120" sy="63120" algn="ctr"/>
+              <a:tile tx="0" ty="0" sx="62411" sy="62411" algn="ctr"/>
             </a:blipFill>
             <a:ln w="0">
               <a:solidFill>
@@ -7364,16 +7364,16 @@
           </p:nvSpPr>
           <p:spPr>
             <a:xfrm rot="5358000">
-              <a:off x="-1562400" y="4482720"/>
-              <a:ext cx="1056960" cy="754560"/>
+              <a:off x="-1560960" y="4482000"/>
+              <a:ext cx="1056240" cy="753840"/>
             </a:xfrm>
             <a:custGeom>
               <a:avLst/>
               <a:gdLst>
-                <a:gd name="textAreaLeft" fmla="*/ 277200 w 1056960"/>
-                <a:gd name="textAreaRight" fmla="*/ 792000 w 1056960"/>
-                <a:gd name="textAreaTop" fmla="*/ 258840 h 754560"/>
-                <a:gd name="textAreaBottom" fmla="*/ 507600 h 754560"/>
+                <a:gd name="textAreaLeft" fmla="*/ 277200 w 1056240"/>
+                <a:gd name="textAreaRight" fmla="*/ 792000 w 1056240"/>
+                <a:gd name="textAreaTop" fmla="*/ 258840 h 753840"/>
+                <a:gd name="textAreaBottom" fmla="*/ 507600 h 753840"/>
               </a:gdLst>
               <a:ahLst/>
               <a:rect l="textAreaLeft" t="textAreaTop" r="textAreaRight" b="textAreaBottom"/>
@@ -7721,7 +7721,7 @@
             <a:blipFill rotWithShape="0">
               <a:blip r:embed="rId3"/>
               <a:srcRect/>
-              <a:tile tx="0" ty="0" sx="63120" sy="63120" algn="ctr"/>
+              <a:tile tx="0" ty="0" sx="62411" sy="62411" algn="ctr"/>
             </a:blipFill>
             <a:ln w="0">
               <a:solidFill>
@@ -7770,16 +7770,16 @@
           </p:nvSpPr>
           <p:spPr>
             <a:xfrm rot="5358000">
-              <a:off x="-2214720" y="5158800"/>
-              <a:ext cx="1056960" cy="754560"/>
+              <a:off x="-2213280" y="5158080"/>
+              <a:ext cx="1056240" cy="753840"/>
             </a:xfrm>
             <a:custGeom>
               <a:avLst/>
               <a:gdLst>
-                <a:gd name="textAreaLeft" fmla="*/ 277200 w 1056960"/>
-                <a:gd name="textAreaRight" fmla="*/ 792000 w 1056960"/>
-                <a:gd name="textAreaTop" fmla="*/ 258840 h 754560"/>
-                <a:gd name="textAreaBottom" fmla="*/ 507600 h 754560"/>
+                <a:gd name="textAreaLeft" fmla="*/ 277200 w 1056240"/>
+                <a:gd name="textAreaRight" fmla="*/ 792000 w 1056240"/>
+                <a:gd name="textAreaTop" fmla="*/ 258840 h 753840"/>
+                <a:gd name="textAreaBottom" fmla="*/ 507600 h 753840"/>
               </a:gdLst>
               <a:ahLst/>
               <a:rect l="textAreaLeft" t="textAreaTop" r="textAreaRight" b="textAreaBottom"/>
@@ -8174,16 +8174,16 @@
           </p:nvSpPr>
           <p:spPr>
             <a:xfrm rot="5358000">
-              <a:off x="-873360" y="3809520"/>
-              <a:ext cx="1056960" cy="754560"/>
+              <a:off x="-871920" y="3808800"/>
+              <a:ext cx="1056240" cy="753840"/>
             </a:xfrm>
             <a:custGeom>
               <a:avLst/>
               <a:gdLst>
-                <a:gd name="textAreaLeft" fmla="*/ 277200 w 1056960"/>
-                <a:gd name="textAreaRight" fmla="*/ 792000 w 1056960"/>
-                <a:gd name="textAreaTop" fmla="*/ 258840 h 754560"/>
-                <a:gd name="textAreaBottom" fmla="*/ 507600 h 754560"/>
+                <a:gd name="textAreaLeft" fmla="*/ 277200 w 1056240"/>
+                <a:gd name="textAreaRight" fmla="*/ 792000 w 1056240"/>
+                <a:gd name="textAreaTop" fmla="*/ 258840 h 753840"/>
+                <a:gd name="textAreaBottom" fmla="*/ 507600 h 753840"/>
               </a:gdLst>
               <a:ahLst/>
               <a:rect l="textAreaLeft" t="textAreaTop" r="textAreaRight" b="textAreaBottom"/>
@@ -8578,16 +8578,16 @@
           </p:nvSpPr>
           <p:spPr>
             <a:xfrm rot="5358000">
-              <a:off x="-198360" y="3142800"/>
-              <a:ext cx="1056960" cy="754560"/>
+              <a:off x="-196920" y="3142080"/>
+              <a:ext cx="1056240" cy="753840"/>
             </a:xfrm>
             <a:custGeom>
               <a:avLst/>
               <a:gdLst>
-                <a:gd name="textAreaLeft" fmla="*/ 277200 w 1056960"/>
-                <a:gd name="textAreaRight" fmla="*/ 792000 w 1056960"/>
-                <a:gd name="textAreaTop" fmla="*/ 258840 h 754560"/>
-                <a:gd name="textAreaBottom" fmla="*/ 507600 h 754560"/>
+                <a:gd name="textAreaLeft" fmla="*/ 277200 w 1056240"/>
+                <a:gd name="textAreaRight" fmla="*/ 792000 w 1056240"/>
+                <a:gd name="textAreaTop" fmla="*/ 258840 h 753840"/>
+                <a:gd name="textAreaBottom" fmla="*/ 507600 h 753840"/>
               </a:gdLst>
               <a:ahLst/>
               <a:rect l="textAreaLeft" t="textAreaTop" r="textAreaRight" b="textAreaBottom"/>
@@ -8983,15 +8983,15 @@
           <p:spPr>
             <a:xfrm>
               <a:off x="455040" y="4477680"/>
-              <a:ext cx="1061280" cy="754560"/>
+              <a:ext cx="1060560" cy="753840"/>
             </a:xfrm>
             <a:custGeom>
               <a:avLst/>
               <a:gdLst>
-                <a:gd name="textAreaLeft" fmla="*/ 278280 w 1061280"/>
-                <a:gd name="textAreaRight" fmla="*/ 794880 w 1061280"/>
-                <a:gd name="textAreaTop" fmla="*/ 258840 h 754560"/>
-                <a:gd name="textAreaBottom" fmla="*/ 507600 h 754560"/>
+                <a:gd name="textAreaLeft" fmla="*/ 278280 w 1060560"/>
+                <a:gd name="textAreaRight" fmla="*/ 794880 w 1060560"/>
+                <a:gd name="textAreaTop" fmla="*/ 258840 h 753840"/>
+                <a:gd name="textAreaBottom" fmla="*/ 507600 h 753840"/>
               </a:gdLst>
               <a:ahLst/>
               <a:rect l="textAreaLeft" t="textAreaTop" r="textAreaRight" b="textAreaBottom"/>
@@ -9386,16 +9386,16 @@
           </p:nvSpPr>
           <p:spPr>
             <a:xfrm rot="5358000">
-              <a:off x="482400" y="3809520"/>
-              <a:ext cx="1056960" cy="754560"/>
+              <a:off x="483120" y="3808800"/>
+              <a:ext cx="1056240" cy="753840"/>
             </a:xfrm>
             <a:custGeom>
               <a:avLst/>
               <a:gdLst>
-                <a:gd name="textAreaLeft" fmla="*/ 277200 w 1056960"/>
-                <a:gd name="textAreaRight" fmla="*/ 792000 w 1056960"/>
-                <a:gd name="textAreaTop" fmla="*/ 258840 h 754560"/>
-                <a:gd name="textAreaBottom" fmla="*/ 507600 h 754560"/>
+                <a:gd name="textAreaLeft" fmla="*/ 277200 w 1056240"/>
+                <a:gd name="textAreaRight" fmla="*/ 792000 w 1056240"/>
+                <a:gd name="textAreaTop" fmla="*/ 258840 h 753840"/>
+                <a:gd name="textAreaBottom" fmla="*/ 507600 h 753840"/>
               </a:gdLst>
               <a:ahLst/>
               <a:rect l="textAreaLeft" t="textAreaTop" r="textAreaRight" b="textAreaBottom"/>
@@ -9791,15 +9791,15 @@
           <p:spPr>
             <a:xfrm>
               <a:off x="1158840" y="5170680"/>
-              <a:ext cx="1061280" cy="754560"/>
+              <a:ext cx="1060560" cy="753840"/>
             </a:xfrm>
             <a:custGeom>
               <a:avLst/>
               <a:gdLst>
-                <a:gd name="textAreaLeft" fmla="*/ 278280 w 1061280"/>
-                <a:gd name="textAreaRight" fmla="*/ 794880 w 1061280"/>
-                <a:gd name="textAreaTop" fmla="*/ 258840 h 754560"/>
-                <a:gd name="textAreaBottom" fmla="*/ 507600 h 754560"/>
+                <a:gd name="textAreaLeft" fmla="*/ 278280 w 1060560"/>
+                <a:gd name="textAreaRight" fmla="*/ 794880 w 1060560"/>
+                <a:gd name="textAreaTop" fmla="*/ 258840 h 753840"/>
+                <a:gd name="textAreaBottom" fmla="*/ 507600 h 753840"/>
               </a:gdLst>
               <a:ahLst/>
               <a:rect l="textAreaLeft" t="textAreaTop" r="textAreaRight" b="textAreaBottom"/>
@@ -10195,15 +10195,15 @@
           <p:spPr>
             <a:xfrm>
               <a:off x="-1561680" y="5162760"/>
-              <a:ext cx="1061280" cy="754560"/>
+              <a:ext cx="1060560" cy="753840"/>
             </a:xfrm>
             <a:custGeom>
               <a:avLst/>
               <a:gdLst>
-                <a:gd name="textAreaLeft" fmla="*/ 278280 w 1061280"/>
-                <a:gd name="textAreaRight" fmla="*/ 794880 w 1061280"/>
-                <a:gd name="textAreaTop" fmla="*/ 258840 h 754560"/>
-                <a:gd name="textAreaBottom" fmla="*/ 507600 h 754560"/>
+                <a:gd name="textAreaLeft" fmla="*/ 278280 w 1060560"/>
+                <a:gd name="textAreaRight" fmla="*/ 794880 w 1060560"/>
+                <a:gd name="textAreaTop" fmla="*/ 258840 h 753840"/>
+                <a:gd name="textAreaBottom" fmla="*/ 507600 h 753840"/>
               </a:gdLst>
               <a:ahLst/>
               <a:rect l="textAreaLeft" t="textAreaTop" r="textAreaRight" b="textAreaBottom"/>
@@ -10598,16 +10598,16 @@
           </p:nvSpPr>
           <p:spPr>
             <a:xfrm rot="5358000">
-              <a:off x="473400" y="5158800"/>
-              <a:ext cx="1056960" cy="754560"/>
+              <a:off x="474120" y="5158080"/>
+              <a:ext cx="1056240" cy="753840"/>
             </a:xfrm>
             <a:custGeom>
               <a:avLst/>
               <a:gdLst>
-                <a:gd name="textAreaLeft" fmla="*/ 277200 w 1056960"/>
-                <a:gd name="textAreaRight" fmla="*/ 792000 w 1056960"/>
-                <a:gd name="textAreaTop" fmla="*/ 258840 h 754560"/>
-                <a:gd name="textAreaBottom" fmla="*/ 507600 h 754560"/>
+                <a:gd name="textAreaLeft" fmla="*/ 277200 w 1056240"/>
+                <a:gd name="textAreaRight" fmla="*/ 792000 w 1056240"/>
+                <a:gd name="textAreaTop" fmla="*/ 258840 h 753840"/>
+                <a:gd name="textAreaBottom" fmla="*/ 507600 h 753840"/>
               </a:gdLst>
               <a:ahLst/>
               <a:rect l="textAreaLeft" t="textAreaTop" r="textAreaRight" b="textAreaBottom"/>
@@ -11002,16 +11002,16 @@
           </p:nvSpPr>
           <p:spPr>
             <a:xfrm flipH="1" rot="16242000">
-              <a:off x="-220320" y="1782000"/>
-              <a:ext cx="1056960" cy="754560"/>
+              <a:off x="-219600" y="1781280"/>
+              <a:ext cx="1056240" cy="753840"/>
             </a:xfrm>
             <a:custGeom>
               <a:avLst/>
               <a:gdLst>
-                <a:gd name="textAreaLeft" fmla="*/ 271080 w 1056960"/>
-                <a:gd name="textAreaRight" fmla="*/ 785880 w 1056960"/>
-                <a:gd name="textAreaTop" fmla="*/ 258840 h 754560"/>
-                <a:gd name="textAreaBottom" fmla="*/ 507600 h 754560"/>
+                <a:gd name="textAreaLeft" fmla="*/ 270720 w 1056240"/>
+                <a:gd name="textAreaRight" fmla="*/ 785520 w 1056240"/>
+                <a:gd name="textAreaTop" fmla="*/ 258840 h 753840"/>
+                <a:gd name="textAreaBottom" fmla="*/ 507600 h 753840"/>
               </a:gdLst>
               <a:ahLst/>
               <a:rect l="textAreaLeft" t="textAreaTop" r="textAreaRight" b="textAreaBottom"/>
@@ -11406,16 +11406,16 @@
           </p:nvSpPr>
           <p:spPr>
             <a:xfrm flipH="1" rot="16242000">
-              <a:off x="419760" y="2458080"/>
-              <a:ext cx="1056960" cy="754560"/>
+              <a:off x="419760" y="2457360"/>
+              <a:ext cx="1056240" cy="753840"/>
             </a:xfrm>
             <a:custGeom>
               <a:avLst/>
               <a:gdLst>
-                <a:gd name="textAreaLeft" fmla="*/ 271080 w 1056960"/>
-                <a:gd name="textAreaRight" fmla="*/ 785880 w 1056960"/>
-                <a:gd name="textAreaTop" fmla="*/ 258840 h 754560"/>
-                <a:gd name="textAreaBottom" fmla="*/ 507600 h 754560"/>
+                <a:gd name="textAreaLeft" fmla="*/ 270720 w 1056240"/>
+                <a:gd name="textAreaRight" fmla="*/ 785520 w 1056240"/>
+                <a:gd name="textAreaTop" fmla="*/ 258840 h 753840"/>
+                <a:gd name="textAreaBottom" fmla="*/ 507600 h 753840"/>
               </a:gdLst>
               <a:ahLst/>
               <a:rect l="textAreaLeft" t="textAreaTop" r="textAreaRight" b="textAreaBottom"/>
@@ -11810,16 +11810,16 @@
           </p:nvSpPr>
           <p:spPr>
             <a:xfrm flipH="1">
-              <a:off x="-258120" y="2462040"/>
-              <a:ext cx="1061280" cy="754560"/>
+              <a:off x="-258840" y="2462040"/>
+              <a:ext cx="1060560" cy="753840"/>
             </a:xfrm>
             <a:custGeom>
               <a:avLst/>
               <a:gdLst>
-                <a:gd name="textAreaLeft" fmla="*/ 284400 w 1061280"/>
-                <a:gd name="textAreaRight" fmla="*/ 801000 w 1061280"/>
-                <a:gd name="textAreaTop" fmla="*/ 258840 h 754560"/>
-                <a:gd name="textAreaBottom" fmla="*/ 507600 h 754560"/>
+                <a:gd name="textAreaLeft" fmla="*/ 284760 w 1060560"/>
+                <a:gd name="textAreaRight" fmla="*/ 801360 w 1060560"/>
+                <a:gd name="textAreaTop" fmla="*/ 258840 h 753840"/>
+                <a:gd name="textAreaBottom" fmla="*/ 507600 h 753840"/>
               </a:gdLst>
               <a:ahLst/>
               <a:rect l="textAreaLeft" t="textAreaTop" r="textAreaRight" b="textAreaBottom"/>
@@ -12215,15 +12215,15 @@
           <p:spPr>
             <a:xfrm>
               <a:off x="1107720" y="1135080"/>
-              <a:ext cx="1061280" cy="754560"/>
+              <a:ext cx="1060560" cy="753840"/>
             </a:xfrm>
             <a:custGeom>
               <a:avLst/>
               <a:gdLst>
-                <a:gd name="textAreaLeft" fmla="*/ 278280 w 1061280"/>
-                <a:gd name="textAreaRight" fmla="*/ 794880 w 1061280"/>
-                <a:gd name="textAreaTop" fmla="*/ 258840 h 754560"/>
-                <a:gd name="textAreaBottom" fmla="*/ 507600 h 754560"/>
+                <a:gd name="textAreaLeft" fmla="*/ 278280 w 1060560"/>
+                <a:gd name="textAreaRight" fmla="*/ 794880 w 1060560"/>
+                <a:gd name="textAreaTop" fmla="*/ 258840 h 753840"/>
+                <a:gd name="textAreaBottom" fmla="*/ 507600 h 753840"/>
               </a:gdLst>
               <a:ahLst/>
               <a:rect l="textAreaLeft" t="textAreaTop" r="textAreaRight" b="textAreaBottom"/>
@@ -12618,16 +12618,16 @@
           </p:nvSpPr>
           <p:spPr>
             <a:xfrm rot="5358000">
-              <a:off x="1114920" y="1789920"/>
-              <a:ext cx="1056960" cy="754560"/>
+              <a:off x="1115640" y="1789200"/>
+              <a:ext cx="1056240" cy="753840"/>
             </a:xfrm>
             <a:custGeom>
               <a:avLst/>
               <a:gdLst>
-                <a:gd name="textAreaLeft" fmla="*/ 277200 w 1056960"/>
-                <a:gd name="textAreaRight" fmla="*/ 792000 w 1056960"/>
-                <a:gd name="textAreaTop" fmla="*/ 258840 h 754560"/>
-                <a:gd name="textAreaBottom" fmla="*/ 507600 h 754560"/>
+                <a:gd name="textAreaLeft" fmla="*/ 277200 w 1056240"/>
+                <a:gd name="textAreaRight" fmla="*/ 792000 w 1056240"/>
+                <a:gd name="textAreaTop" fmla="*/ 258840 h 753840"/>
+                <a:gd name="textAreaBottom" fmla="*/ 507600 h 753840"/>
               </a:gdLst>
               <a:ahLst/>
               <a:rect l="textAreaLeft" t="textAreaTop" r="textAreaRight" b="textAreaBottom"/>
@@ -13022,16 +13022,16 @@
           </p:nvSpPr>
           <p:spPr>
             <a:xfrm rot="5358000">
-              <a:off x="426240" y="1131120"/>
-              <a:ext cx="1056960" cy="754560"/>
+              <a:off x="426960" y="1130400"/>
+              <a:ext cx="1056240" cy="753840"/>
             </a:xfrm>
             <a:custGeom>
               <a:avLst/>
               <a:gdLst>
-                <a:gd name="textAreaLeft" fmla="*/ 277200 w 1056960"/>
-                <a:gd name="textAreaRight" fmla="*/ 792000 w 1056960"/>
-                <a:gd name="textAreaTop" fmla="*/ 258840 h 754560"/>
-                <a:gd name="textAreaBottom" fmla="*/ 507600 h 754560"/>
+                <a:gd name="textAreaLeft" fmla="*/ 277200 w 1056240"/>
+                <a:gd name="textAreaRight" fmla="*/ 792000 w 1056240"/>
+                <a:gd name="textAreaTop" fmla="*/ 258840 h 753840"/>
+                <a:gd name="textAreaBottom" fmla="*/ 507600 h 753840"/>
               </a:gdLst>
               <a:ahLst/>
               <a:rect l="textAreaLeft" t="textAreaTop" r="textAreaRight" b="textAreaBottom"/>
@@ -13379,7 +13379,7 @@
             <a:blipFill rotWithShape="0">
               <a:blip r:embed="rId4"/>
               <a:srcRect/>
-              <a:tile tx="0" ty="0" sx="63120" sy="63120" algn="ctr"/>
+              <a:tile tx="0" ty="0" sx="62411" sy="62411" algn="ctr"/>
             </a:blipFill>
             <a:ln w="0">
               <a:solidFill>
@@ -13429,15 +13429,15 @@
           <p:spPr>
             <a:xfrm>
               <a:off x="439200" y="1811160"/>
-              <a:ext cx="1061280" cy="754560"/>
+              <a:ext cx="1060560" cy="753840"/>
             </a:xfrm>
             <a:custGeom>
               <a:avLst/>
               <a:gdLst>
-                <a:gd name="textAreaLeft" fmla="*/ 278280 w 1061280"/>
-                <a:gd name="textAreaRight" fmla="*/ 794880 w 1061280"/>
-                <a:gd name="textAreaTop" fmla="*/ 258840 h 754560"/>
-                <a:gd name="textAreaBottom" fmla="*/ 507600 h 754560"/>
+                <a:gd name="textAreaLeft" fmla="*/ 278280 w 1060560"/>
+                <a:gd name="textAreaRight" fmla="*/ 794880 w 1060560"/>
+                <a:gd name="textAreaTop" fmla="*/ 258840 h 753840"/>
+                <a:gd name="textAreaBottom" fmla="*/ 507600 h 753840"/>
               </a:gdLst>
               <a:ahLst/>
               <a:rect l="textAreaLeft" t="textAreaTop" r="textAreaRight" b="textAreaBottom"/>
@@ -13833,15 +13833,15 @@
           <p:spPr>
             <a:xfrm>
               <a:off x="423720" y="451080"/>
-              <a:ext cx="1061280" cy="754560"/>
+              <a:ext cx="1060560" cy="753840"/>
             </a:xfrm>
             <a:custGeom>
               <a:avLst/>
               <a:gdLst>
-                <a:gd name="textAreaLeft" fmla="*/ 278280 w 1061280"/>
-                <a:gd name="textAreaRight" fmla="*/ 794880 w 1061280"/>
-                <a:gd name="textAreaTop" fmla="*/ 258840 h 754560"/>
-                <a:gd name="textAreaBottom" fmla="*/ 507600 h 754560"/>
+                <a:gd name="textAreaLeft" fmla="*/ 278280 w 1060560"/>
+                <a:gd name="textAreaRight" fmla="*/ 794880 w 1060560"/>
+                <a:gd name="textAreaTop" fmla="*/ 258840 h 753840"/>
+                <a:gd name="textAreaBottom" fmla="*/ 507600 h 753840"/>
               </a:gdLst>
               <a:ahLst/>
               <a:rect l="textAreaLeft" t="textAreaTop" r="textAreaRight" b="textAreaBottom"/>
@@ -14236,16 +14236,16 @@
           </p:nvSpPr>
           <p:spPr>
             <a:xfrm rot="5358000">
-              <a:off x="-222840" y="426960"/>
-              <a:ext cx="1056960" cy="754560"/>
+              <a:off x="-221400" y="426240"/>
+              <a:ext cx="1056240" cy="753840"/>
             </a:xfrm>
             <a:custGeom>
               <a:avLst/>
               <a:gdLst>
-                <a:gd name="textAreaLeft" fmla="*/ 277200 w 1056960"/>
-                <a:gd name="textAreaRight" fmla="*/ 792000 w 1056960"/>
-                <a:gd name="textAreaTop" fmla="*/ 258840 h 754560"/>
-                <a:gd name="textAreaBottom" fmla="*/ 507600 h 754560"/>
+                <a:gd name="textAreaLeft" fmla="*/ 277200 w 1056240"/>
+                <a:gd name="textAreaRight" fmla="*/ 792000 w 1056240"/>
+                <a:gd name="textAreaTop" fmla="*/ 258840 h 753840"/>
+                <a:gd name="textAreaBottom" fmla="*/ 507600 h 753840"/>
               </a:gdLst>
               <a:ahLst/>
               <a:rect l="textAreaLeft" t="textAreaTop" r="textAreaRight" b="textAreaBottom"/>
@@ -14640,16 +14640,16 @@
           </p:nvSpPr>
           <p:spPr>
             <a:xfrm rot="5358000">
-              <a:off x="446760" y="-246240"/>
-              <a:ext cx="1056960" cy="754560"/>
+              <a:off x="447480" y="-246240"/>
+              <a:ext cx="1056240" cy="753840"/>
             </a:xfrm>
             <a:custGeom>
               <a:avLst/>
               <a:gdLst>
-                <a:gd name="textAreaLeft" fmla="*/ 277200 w 1056960"/>
-                <a:gd name="textAreaRight" fmla="*/ 792000 w 1056960"/>
-                <a:gd name="textAreaTop" fmla="*/ 258840 h 754560"/>
-                <a:gd name="textAreaBottom" fmla="*/ 507600 h 754560"/>
+                <a:gd name="textAreaLeft" fmla="*/ 277200 w 1056240"/>
+                <a:gd name="textAreaRight" fmla="*/ 792000 w 1056240"/>
+                <a:gd name="textAreaTop" fmla="*/ 258840 h 753840"/>
+                <a:gd name="textAreaBottom" fmla="*/ 507600 h 753840"/>
               </a:gdLst>
               <a:ahLst/>
               <a:rect l="textAreaLeft" t="textAreaTop" r="textAreaRight" b="textAreaBottom"/>
@@ -15045,15 +15045,15 @@
           <p:spPr>
             <a:xfrm>
               <a:off x="1779480" y="1794600"/>
-              <a:ext cx="1061280" cy="754560"/>
+              <a:ext cx="1060560" cy="753840"/>
             </a:xfrm>
             <a:custGeom>
               <a:avLst/>
               <a:gdLst>
-                <a:gd name="textAreaLeft" fmla="*/ 278280 w 1061280"/>
-                <a:gd name="textAreaRight" fmla="*/ 794880 w 1061280"/>
-                <a:gd name="textAreaTop" fmla="*/ 258840 h 754560"/>
-                <a:gd name="textAreaBottom" fmla="*/ 507600 h 754560"/>
+                <a:gd name="textAreaLeft" fmla="*/ 278280 w 1060560"/>
+                <a:gd name="textAreaRight" fmla="*/ 794880 w 1060560"/>
+                <a:gd name="textAreaTop" fmla="*/ 258840 h 753840"/>
+                <a:gd name="textAreaBottom" fmla="*/ 507600 h 753840"/>
               </a:gdLst>
               <a:ahLst/>
               <a:rect l="textAreaLeft" t="textAreaTop" r="textAreaRight" b="textAreaBottom"/>
@@ -15449,15 +15449,15 @@
           <p:spPr>
             <a:xfrm>
               <a:off x="1106280" y="-257040"/>
-              <a:ext cx="1061280" cy="754560"/>
+              <a:ext cx="1060560" cy="753840"/>
             </a:xfrm>
             <a:custGeom>
               <a:avLst/>
               <a:gdLst>
-                <a:gd name="textAreaLeft" fmla="*/ 278280 w 1061280"/>
-                <a:gd name="textAreaRight" fmla="*/ 794880 w 1061280"/>
-                <a:gd name="textAreaTop" fmla="*/ 258840 h 754560"/>
-                <a:gd name="textAreaBottom" fmla="*/ 507600 h 754560"/>
+                <a:gd name="textAreaLeft" fmla="*/ 278280 w 1060560"/>
+                <a:gd name="textAreaRight" fmla="*/ 794880 w 1060560"/>
+                <a:gd name="textAreaTop" fmla="*/ 258840 h 753840"/>
+                <a:gd name="textAreaBottom" fmla="*/ 507600 h 753840"/>
               </a:gdLst>
               <a:ahLst/>
               <a:rect l="textAreaLeft" t="textAreaTop" r="textAreaRight" b="textAreaBottom"/>
@@ -15805,7 +15805,7 @@
             <a:blipFill rotWithShape="0">
               <a:blip r:embed="rId5"/>
               <a:srcRect/>
-              <a:tile tx="0" ty="0" sx="63120" sy="63120" algn="ctr"/>
+              <a:tile tx="0" ty="0" sx="62411" sy="62411" algn="ctr"/>
             </a:blipFill>
             <a:ln w="0">
               <a:solidFill>
@@ -15855,15 +15855,15 @@
           <p:spPr>
             <a:xfrm>
               <a:off x="-908280" y="1790640"/>
-              <a:ext cx="1061280" cy="754560"/>
+              <a:ext cx="1060560" cy="753840"/>
             </a:xfrm>
             <a:custGeom>
               <a:avLst/>
               <a:gdLst>
-                <a:gd name="textAreaLeft" fmla="*/ 278280 w 1061280"/>
-                <a:gd name="textAreaRight" fmla="*/ 794880 w 1061280"/>
-                <a:gd name="textAreaTop" fmla="*/ 258840 h 754560"/>
-                <a:gd name="textAreaBottom" fmla="*/ 507600 h 754560"/>
+                <a:gd name="textAreaLeft" fmla="*/ 278280 w 1060560"/>
+                <a:gd name="textAreaRight" fmla="*/ 794880 w 1060560"/>
+                <a:gd name="textAreaTop" fmla="*/ 258840 h 753840"/>
+                <a:gd name="textAreaBottom" fmla="*/ 507600 h 753840"/>
               </a:gdLst>
               <a:ahLst/>
               <a:rect l="textAreaLeft" t="textAreaTop" r="textAreaRight" b="textAreaBottom"/>
@@ -16211,7 +16211,7 @@
             <a:blipFill rotWithShape="0">
               <a:blip r:embed="rId6"/>
               <a:srcRect/>
-              <a:tile tx="0" ty="0" sx="63120" sy="63120" algn="ctr"/>
+              <a:tile tx="0" ty="0" sx="62411" sy="62411" algn="ctr"/>
             </a:blipFill>
             <a:ln w="0">
               <a:solidFill>
@@ -16260,16 +16260,16 @@
           </p:nvSpPr>
           <p:spPr>
             <a:xfrm rot="5358000">
-              <a:off x="-222120" y="5813280"/>
-              <a:ext cx="1056960" cy="754560"/>
+              <a:off x="-220680" y="5812560"/>
+              <a:ext cx="1056240" cy="753840"/>
             </a:xfrm>
             <a:custGeom>
               <a:avLst/>
               <a:gdLst>
-                <a:gd name="textAreaLeft" fmla="*/ 277200 w 1056960"/>
-                <a:gd name="textAreaRight" fmla="*/ 792000 w 1056960"/>
-                <a:gd name="textAreaTop" fmla="*/ 258840 h 754560"/>
-                <a:gd name="textAreaBottom" fmla="*/ 507600 h 754560"/>
+                <a:gd name="textAreaLeft" fmla="*/ 277200 w 1056240"/>
+                <a:gd name="textAreaRight" fmla="*/ 792000 w 1056240"/>
+                <a:gd name="textAreaTop" fmla="*/ 258840 h 753840"/>
+                <a:gd name="textAreaBottom" fmla="*/ 507600 h 753840"/>
               </a:gdLst>
               <a:ahLst/>
               <a:rect l="textAreaLeft" t="textAreaTop" r="textAreaRight" b="textAreaBottom"/>
@@ -16665,15 +16665,15 @@
           <p:spPr>
             <a:xfrm>
               <a:off x="427320" y="5853960"/>
-              <a:ext cx="1061280" cy="754560"/>
+              <a:ext cx="1060560" cy="753840"/>
             </a:xfrm>
             <a:custGeom>
               <a:avLst/>
               <a:gdLst>
-                <a:gd name="textAreaLeft" fmla="*/ 278280 w 1061280"/>
-                <a:gd name="textAreaRight" fmla="*/ 794880 w 1061280"/>
-                <a:gd name="textAreaTop" fmla="*/ 258840 h 754560"/>
-                <a:gd name="textAreaBottom" fmla="*/ 507600 h 754560"/>
+                <a:gd name="textAreaLeft" fmla="*/ 278280 w 1060560"/>
+                <a:gd name="textAreaRight" fmla="*/ 794880 w 1060560"/>
+                <a:gd name="textAreaTop" fmla="*/ 258840 h 753840"/>
+                <a:gd name="textAreaBottom" fmla="*/ 507600 h 753840"/>
               </a:gdLst>
               <a:ahLst/>
               <a:rect l="textAreaLeft" t="textAreaTop" r="textAreaRight" b="textAreaBottom"/>
@@ -17021,7 +17021,7 @@
             <a:blipFill rotWithShape="0">
               <a:blip r:embed="rId7"/>
               <a:srcRect/>
-              <a:tile tx="0" ty="0" sx="63120" sy="63120" algn="ctr"/>
+              <a:tile tx="0" ty="0" sx="62411" sy="62411" algn="ctr"/>
             </a:blipFill>
             <a:ln w="0">
               <a:solidFill>
@@ -17071,15 +17071,15 @@
           <p:spPr>
             <a:xfrm>
               <a:off x="-236880" y="6494040"/>
-              <a:ext cx="1061280" cy="754560"/>
+              <a:ext cx="1060560" cy="753840"/>
             </a:xfrm>
             <a:custGeom>
               <a:avLst/>
               <a:gdLst>
-                <a:gd name="textAreaLeft" fmla="*/ 278280 w 1061280"/>
-                <a:gd name="textAreaRight" fmla="*/ 794880 w 1061280"/>
-                <a:gd name="textAreaTop" fmla="*/ 258840 h 754560"/>
-                <a:gd name="textAreaBottom" fmla="*/ 507600 h 754560"/>
+                <a:gd name="textAreaLeft" fmla="*/ 278280 w 1060560"/>
+                <a:gd name="textAreaRight" fmla="*/ 794880 w 1060560"/>
+                <a:gd name="textAreaTop" fmla="*/ 258840 h 753840"/>
+                <a:gd name="textAreaBottom" fmla="*/ 507600 h 753840"/>
               </a:gdLst>
               <a:ahLst/>
               <a:rect l="textAreaLeft" t="textAreaTop" r="textAreaRight" b="textAreaBottom"/>
@@ -17474,16 +17474,16 @@
           </p:nvSpPr>
           <p:spPr>
             <a:xfrm rot="5358000">
-              <a:off x="-906120" y="6490080"/>
-              <a:ext cx="1056960" cy="754560"/>
+              <a:off x="-904680" y="6489360"/>
+              <a:ext cx="1056240" cy="753840"/>
             </a:xfrm>
             <a:custGeom>
               <a:avLst/>
               <a:gdLst>
-                <a:gd name="textAreaLeft" fmla="*/ 277200 w 1056960"/>
-                <a:gd name="textAreaRight" fmla="*/ 792000 w 1056960"/>
-                <a:gd name="textAreaTop" fmla="*/ 258840 h 754560"/>
-                <a:gd name="textAreaBottom" fmla="*/ 507600 h 754560"/>
+                <a:gd name="textAreaLeft" fmla="*/ 277200 w 1056240"/>
+                <a:gd name="textAreaRight" fmla="*/ 792000 w 1056240"/>
+                <a:gd name="textAreaTop" fmla="*/ 258840 h 753840"/>
+                <a:gd name="textAreaBottom" fmla="*/ 507600 h 753840"/>
               </a:gdLst>
               <a:ahLst/>
               <a:rect l="textAreaLeft" t="textAreaTop" r="textAreaRight" b="textAreaBottom"/>
@@ -17878,16 +17878,16 @@
           </p:nvSpPr>
           <p:spPr>
             <a:xfrm rot="5358000">
-              <a:off x="-234720" y="7197120"/>
-              <a:ext cx="1056600" cy="754560"/>
+              <a:off x="-234000" y="7197120"/>
+              <a:ext cx="1055880" cy="753840"/>
             </a:xfrm>
             <a:custGeom>
               <a:avLst/>
               <a:gdLst>
-                <a:gd name="textAreaLeft" fmla="*/ 276840 w 1056600"/>
-                <a:gd name="textAreaRight" fmla="*/ 791640 w 1056600"/>
-                <a:gd name="textAreaTop" fmla="*/ 258840 h 754560"/>
-                <a:gd name="textAreaBottom" fmla="*/ 507600 h 754560"/>
+                <a:gd name="textAreaLeft" fmla="*/ 276840 w 1055880"/>
+                <a:gd name="textAreaRight" fmla="*/ 791640 w 1055880"/>
+                <a:gd name="textAreaTop" fmla="*/ 258840 h 753840"/>
+                <a:gd name="textAreaBottom" fmla="*/ 507600 h 753840"/>
               </a:gdLst>
               <a:ahLst/>
               <a:rect l="textAreaLeft" t="textAreaTop" r="textAreaRight" b="textAreaBottom"/>
@@ -18282,16 +18282,16 @@
           </p:nvSpPr>
           <p:spPr>
             <a:xfrm rot="5358000">
-              <a:off x="438480" y="6506640"/>
-              <a:ext cx="1056960" cy="754560"/>
+              <a:off x="439200" y="6505920"/>
+              <a:ext cx="1056240" cy="753840"/>
             </a:xfrm>
             <a:custGeom>
               <a:avLst/>
               <a:gdLst>
-                <a:gd name="textAreaLeft" fmla="*/ 277200 w 1056960"/>
-                <a:gd name="textAreaRight" fmla="*/ 792000 w 1056960"/>
-                <a:gd name="textAreaTop" fmla="*/ 258840 h 754560"/>
-                <a:gd name="textAreaBottom" fmla="*/ 507600 h 754560"/>
+                <a:gd name="textAreaLeft" fmla="*/ 277200 w 1056240"/>
+                <a:gd name="textAreaRight" fmla="*/ 792000 w 1056240"/>
+                <a:gd name="textAreaTop" fmla="*/ 258840 h 753840"/>
+                <a:gd name="textAreaBottom" fmla="*/ 507600 h 753840"/>
               </a:gdLst>
               <a:ahLst/>
               <a:rect l="textAreaLeft" t="textAreaTop" r="textAreaRight" b="textAreaBottom"/>
@@ -18687,15 +18687,15 @@
           <p:spPr>
             <a:xfrm>
               <a:off x="1103400" y="6530040"/>
-              <a:ext cx="1061280" cy="754560"/>
+              <a:ext cx="1060560" cy="753840"/>
             </a:xfrm>
             <a:custGeom>
               <a:avLst/>
               <a:gdLst>
-                <a:gd name="textAreaLeft" fmla="*/ 278280 w 1061280"/>
-                <a:gd name="textAreaRight" fmla="*/ 794880 w 1061280"/>
-                <a:gd name="textAreaTop" fmla="*/ 258840 h 754560"/>
-                <a:gd name="textAreaBottom" fmla="*/ 507600 h 754560"/>
+                <a:gd name="textAreaLeft" fmla="*/ 278280 w 1060560"/>
+                <a:gd name="textAreaRight" fmla="*/ 794880 w 1060560"/>
+                <a:gd name="textAreaTop" fmla="*/ 258840 h 753840"/>
+                <a:gd name="textAreaBottom" fmla="*/ 507600 h 753840"/>
               </a:gdLst>
               <a:ahLst/>
               <a:rect l="textAreaLeft" t="textAreaTop" r="textAreaRight" b="textAreaBottom"/>
@@ -19092,7 +19092,7 @@
         <p:spPr>
           <a:xfrm>
             <a:off x="3844800" y="1408320"/>
-            <a:ext cx="1085400" cy="1213920"/>
+            <a:ext cx="1084680" cy="1213200"/>
           </a:xfrm>
           <a:prstGeom prst="rect">
             <a:avLst/>
@@ -19146,7 +19146,7 @@
         <p:spPr>
           <a:xfrm>
             <a:off x="7868160" y="3039840"/>
-            <a:ext cx="1085400" cy="1099800"/>
+            <a:ext cx="1084680" cy="1099080"/>
           </a:xfrm>
           <a:prstGeom prst="rect">
             <a:avLst/>
@@ -19200,15 +19200,15 @@
         <p:spPr>
           <a:xfrm>
             <a:off x="8538120" y="3877200"/>
-            <a:ext cx="964080" cy="1359720"/>
+            <a:ext cx="963360" cy="1359000"/>
           </a:xfrm>
           <a:custGeom>
             <a:avLst/>
             <a:gdLst>
-              <a:gd name="textAreaLeft" fmla="*/ 0 w 964080"/>
-              <a:gd name="textAreaRight" fmla="*/ 975960 w 964080"/>
-              <a:gd name="textAreaTop" fmla="*/ 0 h 1359720"/>
-              <a:gd name="textAreaBottom" fmla="*/ 1371600 h 1359720"/>
+              <a:gd name="textAreaLeft" fmla="*/ 0 w 963360"/>
+              <a:gd name="textAreaRight" fmla="*/ 975960 w 963360"/>
+              <a:gd name="textAreaTop" fmla="*/ 0 h 1359000"/>
+              <a:gd name="textAreaBottom" fmla="*/ 1371600 h 1359000"/>
             </a:gdLst>
             <a:ahLst/>
             <a:rect l="textAreaLeft" t="textAreaTop" r="textAreaRight" b="textAreaBottom"/>
@@ -19283,7 +19283,7 @@
         <p:spPr>
           <a:xfrm>
             <a:off x="7372080" y="4974480"/>
-            <a:ext cx="1672920" cy="1634040"/>
+            <a:ext cx="1672200" cy="1633320"/>
           </a:xfrm>
           <a:prstGeom prst="ellipse">
             <a:avLst/>
@@ -19332,7 +19332,7 @@
         <p:spPr>
           <a:xfrm>
             <a:off x="7868160" y="-329040"/>
-            <a:ext cx="1999800" cy="1999800"/>
+            <a:ext cx="1999080" cy="1999080"/>
           </a:xfrm>
           <a:prstGeom prst="ellipse">
             <a:avLst/>
@@ -19381,7 +19381,7 @@
         <p:spPr>
           <a:xfrm>
             <a:off x="2982960" y="3757320"/>
-            <a:ext cx="1032840" cy="290880"/>
+            <a:ext cx="1032120" cy="290160"/>
           </a:xfrm>
           <a:prstGeom prst="rect">
             <a:avLst/>
@@ -19461,7 +19461,7 @@
         <p:spPr>
           <a:xfrm>
             <a:off x="8266320" y="4115520"/>
-            <a:ext cx="1908360" cy="1908360"/>
+            <a:ext cx="1907640" cy="1907640"/>
           </a:xfrm>
           <a:prstGeom prst="ellipse">
             <a:avLst/>
@@ -19510,7 +19510,7 @@
         <p:spPr>
           <a:xfrm>
             <a:off x="7717680" y="-548280"/>
-            <a:ext cx="1908360" cy="1908360"/>
+            <a:ext cx="1907640" cy="1907640"/>
           </a:xfrm>
           <a:prstGeom prst="ellipse">
             <a:avLst/>
@@ -19558,10 +19558,10 @@
         </p:nvGrpSpPr>
         <p:grpSpPr>
           <a:xfrm>
-            <a:off x="-135720" y="-284400"/>
-            <a:ext cx="892080" cy="1257480"/>
-            <a:chOff x="-135720" y="-284400"/>
-            <a:chExt cx="892080" cy="1257480"/>
+            <a:off x="-135000" y="-283680"/>
+            <a:ext cx="890640" cy="1256040"/>
+            <a:chOff x="-135000" y="-283680"/>
+            <a:chExt cx="890640" cy="1256040"/>
           </a:xfrm>
         </p:grpSpPr>
         <p:sp>
@@ -19573,7 +19573,7 @@
           <p:spPr>
             <a:xfrm flipV="1" rot="5395800">
               <a:off x="219240" y="801360"/>
-              <a:ext cx="171000" cy="171000"/>
+              <a:ext cx="170280" cy="170280"/>
             </a:xfrm>
             <a:prstGeom prst="ellipse">
               <a:avLst/>
@@ -19581,7 +19581,7 @@
             <a:blipFill rotWithShape="0">
               <a:blip r:embed="rId2"/>
               <a:srcRect/>
-              <a:tile tx="0" ty="0" sx="63120" sy="63120" algn="ctr"/>
+              <a:tile tx="0" ty="0" sx="62411" sy="62411" algn="ctr"/>
             </a:blipFill>
             <a:ln w="0">
               <a:noFill/>
@@ -19629,7 +19629,7 @@
           <p:spPr>
             <a:xfrm flipV="1" rot="5395800">
               <a:off x="218880" y="435600"/>
-              <a:ext cx="171000" cy="171000"/>
+              <a:ext cx="170280" cy="170280"/>
             </a:xfrm>
             <a:prstGeom prst="ellipse">
               <a:avLst/>
@@ -19637,7 +19637,7 @@
             <a:blipFill rotWithShape="0">
               <a:blip r:embed="rId3"/>
               <a:srcRect/>
-              <a:tile tx="0" ty="0" sx="63120" sy="63120" algn="ctr"/>
+              <a:tile tx="0" ty="0" sx="62411" sy="62411" algn="ctr"/>
             </a:blipFill>
             <a:ln w="0">
               <a:noFill/>
@@ -19685,7 +19685,7 @@
           <p:spPr>
             <a:xfrm flipV="1" rot="5395800">
               <a:off x="218520" y="70200"/>
-              <a:ext cx="171000" cy="171000"/>
+              <a:ext cx="170280" cy="170280"/>
             </a:xfrm>
             <a:prstGeom prst="ellipse">
               <a:avLst/>
@@ -19693,7 +19693,7 @@
             <a:blipFill rotWithShape="0">
               <a:blip r:embed="rId4"/>
               <a:srcRect/>
-              <a:tile tx="0" ty="0" sx="63120" sy="63120" algn="ctr"/>
+              <a:tile tx="0" ty="0" sx="62411" sy="62411" algn="ctr"/>
             </a:blipFill>
             <a:ln w="0">
               <a:noFill/>
@@ -19740,8 +19740,8 @@
           </p:nvSpPr>
           <p:spPr>
             <a:xfrm flipV="1" rot="5395800">
-              <a:off x="217800" y="-283680"/>
-              <a:ext cx="171000" cy="171000"/>
+              <a:off x="217800" y="-282960"/>
+              <a:ext cx="170280" cy="170280"/>
             </a:xfrm>
             <a:prstGeom prst="ellipse">
               <a:avLst/>
@@ -19749,7 +19749,7 @@
             <a:blipFill rotWithShape="0">
               <a:blip r:embed="rId5"/>
               <a:srcRect/>
-              <a:tile tx="0" ty="0" sx="63120" sy="63120" algn="ctr"/>
+              <a:tile tx="0" ty="0" sx="62411" sy="62411" algn="ctr"/>
             </a:blipFill>
             <a:ln w="0">
               <a:noFill/>
@@ -19796,8 +19796,8 @@
           </p:nvSpPr>
           <p:spPr>
             <a:xfrm flipV="1" rot="5395800">
-              <a:off x="583920" y="-284040"/>
-              <a:ext cx="171000" cy="171000"/>
+              <a:off x="583920" y="-283320"/>
+              <a:ext cx="170280" cy="170280"/>
             </a:xfrm>
             <a:prstGeom prst="ellipse">
               <a:avLst/>
@@ -19805,7 +19805,7 @@
             <a:blipFill rotWithShape="0">
               <a:blip r:embed="rId6"/>
               <a:srcRect/>
-              <a:tile tx="0" ty="0" sx="63120" sy="63120" algn="ctr"/>
+              <a:tile tx="0" ty="0" sx="62411" sy="62411" algn="ctr"/>
             </a:blipFill>
             <a:ln w="0">
               <a:noFill/>
@@ -19853,7 +19853,7 @@
           <p:spPr>
             <a:xfrm flipV="1" rot="5395800">
               <a:off x="584280" y="69480"/>
-              <a:ext cx="171000" cy="171000"/>
+              <a:ext cx="170280" cy="170280"/>
             </a:xfrm>
             <a:prstGeom prst="ellipse">
               <a:avLst/>
@@ -19861,7 +19861,7 @@
             <a:blipFill rotWithShape="0">
               <a:blip r:embed="rId7"/>
               <a:srcRect/>
-              <a:tile tx="0" ty="0" sx="63120" sy="63120" algn="ctr"/>
+              <a:tile tx="0" ty="0" sx="62411" sy="62411" algn="ctr"/>
             </a:blipFill>
             <a:ln w="0">
               <a:noFill/>
@@ -19909,7 +19909,7 @@
           <p:spPr>
             <a:xfrm flipV="1" rot="5395800">
               <a:off x="584280" y="435240"/>
-              <a:ext cx="171000" cy="171000"/>
+              <a:ext cx="170280" cy="170280"/>
             </a:xfrm>
             <a:prstGeom prst="ellipse">
               <a:avLst/>
@@ -19917,7 +19917,7 @@
             <a:blipFill rotWithShape="0">
               <a:blip r:embed="rId8"/>
               <a:srcRect/>
-              <a:tile tx="0" ty="0" sx="63120" sy="63120" algn="ctr"/>
+              <a:tile tx="0" ty="0" sx="62411" sy="62411" algn="ctr"/>
             </a:blipFill>
             <a:ln w="0">
               <a:noFill/>
@@ -19965,7 +19965,7 @@
           <p:spPr>
             <a:xfrm flipV="1" rot="5395800">
               <a:off x="585000" y="801360"/>
-              <a:ext cx="171000" cy="171000"/>
+              <a:ext cx="170280" cy="170280"/>
             </a:xfrm>
             <a:prstGeom prst="ellipse">
               <a:avLst/>
@@ -19973,7 +19973,7 @@
             <a:blipFill rotWithShape="0">
               <a:blip r:embed="rId9"/>
               <a:srcRect/>
-              <a:tile tx="0" ty="0" sx="63120" sy="63120" algn="ctr"/>
+              <a:tile tx="0" ty="0" sx="62411" sy="62411" algn="ctr"/>
             </a:blipFill>
             <a:ln w="0">
               <a:noFill/>
@@ -20020,8 +20020,8 @@
           </p:nvSpPr>
           <p:spPr>
             <a:xfrm flipV="1" rot="5395800">
-              <a:off x="-134280" y="801720"/>
-              <a:ext cx="171000" cy="171000"/>
+              <a:off x="-133560" y="801720"/>
+              <a:ext cx="170280" cy="170280"/>
             </a:xfrm>
             <a:prstGeom prst="ellipse">
               <a:avLst/>
@@ -20029,7 +20029,7 @@
             <a:blipFill rotWithShape="0">
               <a:blip r:embed="rId10"/>
               <a:srcRect/>
-              <a:tile tx="0" ty="0" sx="63120" sy="63120" algn="ctr"/>
+              <a:tile tx="0" ty="0" sx="62411" sy="62411" algn="ctr"/>
             </a:blipFill>
             <a:ln w="0">
               <a:noFill/>
@@ -20076,8 +20076,8 @@
           </p:nvSpPr>
           <p:spPr>
             <a:xfrm flipV="1" rot="5395800">
-              <a:off x="-135000" y="436320"/>
-              <a:ext cx="171000" cy="171000"/>
+              <a:off x="-134280" y="436320"/>
+              <a:ext cx="170280" cy="170280"/>
             </a:xfrm>
             <a:prstGeom prst="ellipse">
               <a:avLst/>
@@ -20085,7 +20085,7 @@
             <a:blipFill rotWithShape="0">
               <a:blip r:embed="rId11"/>
               <a:srcRect/>
-              <a:tile tx="0" ty="0" sx="63120" sy="63120" algn="ctr"/>
+              <a:tile tx="0" ty="0" sx="62411" sy="62411" algn="ctr"/>
             </a:blipFill>
             <a:ln w="0">
               <a:noFill/>
@@ -20132,8 +20132,8 @@
           </p:nvSpPr>
           <p:spPr>
             <a:xfrm flipV="1" rot="5395800">
-              <a:off x="-135000" y="70200"/>
-              <a:ext cx="171000" cy="171000"/>
+              <a:off x="-134280" y="70200"/>
+              <a:ext cx="170280" cy="170280"/>
             </a:xfrm>
             <a:prstGeom prst="ellipse">
               <a:avLst/>
@@ -20141,7 +20141,7 @@
             <a:blipFill rotWithShape="0">
               <a:blip r:embed="rId12"/>
               <a:srcRect/>
-              <a:tile tx="0" ty="0" sx="63120" sy="63120" algn="ctr"/>
+              <a:tile tx="0" ty="0" sx="62411" sy="62411" algn="ctr"/>
             </a:blipFill>
             <a:ln w="0">
               <a:noFill/>
@@ -20188,8 +20188,8 @@
           </p:nvSpPr>
           <p:spPr>
             <a:xfrm flipV="1" rot="5395800">
-              <a:off x="-135360" y="-283320"/>
-              <a:ext cx="171000" cy="171000"/>
+              <a:off x="-134640" y="-282600"/>
+              <a:ext cx="170280" cy="170280"/>
             </a:xfrm>
             <a:prstGeom prst="ellipse">
               <a:avLst/>
@@ -20197,7 +20197,7 @@
             <a:blipFill rotWithShape="0">
               <a:blip r:embed="rId13"/>
               <a:srcRect/>
-              <a:tile tx="0" ty="0" sx="63120" sy="63120" algn="ctr"/>
+              <a:tile tx="0" ty="0" sx="62411" sy="62411" algn="ctr"/>
             </a:blipFill>
             <a:ln w="0">
               <a:noFill/>
@@ -20246,9 +20246,9 @@
         <p:grpSpPr>
           <a:xfrm>
             <a:off x="9545040" y="4645800"/>
-            <a:ext cx="903960" cy="1269360"/>
+            <a:ext cx="903240" cy="1268640"/>
             <a:chOff x="9545040" y="4645800"/>
-            <a:chExt cx="903960" cy="1269360"/>
+            <a:chExt cx="903240" cy="1268640"/>
           </a:xfrm>
         </p:grpSpPr>
         <p:sp>
@@ -20260,7 +20260,7 @@
           <p:spPr>
             <a:xfrm flipV="1" rot="5395800">
               <a:off x="9911880" y="5743440"/>
-              <a:ext cx="171000" cy="171000"/>
+              <a:ext cx="170280" cy="170280"/>
             </a:xfrm>
             <a:prstGeom prst="ellipse">
               <a:avLst/>
@@ -20268,7 +20268,7 @@
             <a:blipFill rotWithShape="0">
               <a:blip r:embed="rId14"/>
               <a:srcRect/>
-              <a:tile tx="0" ty="0" sx="63120" sy="63120" algn="ctr"/>
+              <a:tile tx="0" ty="0" sx="62411" sy="62411" algn="ctr"/>
             </a:blipFill>
             <a:ln w="0">
               <a:noFill/>
@@ -20316,7 +20316,7 @@
           <p:spPr>
             <a:xfrm flipV="1" rot="5395800">
               <a:off x="9911520" y="5377680"/>
-              <a:ext cx="171000" cy="171000"/>
+              <a:ext cx="170280" cy="170280"/>
             </a:xfrm>
             <a:prstGeom prst="ellipse">
               <a:avLst/>
@@ -20324,7 +20324,7 @@
             <a:blipFill rotWithShape="0">
               <a:blip r:embed="rId15"/>
               <a:srcRect/>
-              <a:tile tx="0" ty="0" sx="63120" sy="63120" algn="ctr"/>
+              <a:tile tx="0" ty="0" sx="62411" sy="62411" algn="ctr"/>
             </a:blipFill>
             <a:ln w="0">
               <a:noFill/>
@@ -20372,7 +20372,7 @@
           <p:spPr>
             <a:xfrm flipV="1" rot="5395800">
               <a:off x="9911160" y="5012280"/>
-              <a:ext cx="171000" cy="171000"/>
+              <a:ext cx="170280" cy="170280"/>
             </a:xfrm>
             <a:prstGeom prst="ellipse">
               <a:avLst/>
@@ -20380,7 +20380,7 @@
             <a:blipFill rotWithShape="0">
               <a:blip r:embed="rId16"/>
               <a:srcRect/>
-              <a:tile tx="0" ty="0" sx="63120" sy="63120" algn="ctr"/>
+              <a:tile tx="0" ty="0" sx="62411" sy="62411" algn="ctr"/>
             </a:blipFill>
             <a:ln w="0">
               <a:noFill/>
@@ -20428,7 +20428,7 @@
           <p:spPr>
             <a:xfrm flipV="1" rot="5395800">
               <a:off x="9910440" y="4646160"/>
-              <a:ext cx="171000" cy="171000"/>
+              <a:ext cx="170280" cy="170280"/>
             </a:xfrm>
             <a:prstGeom prst="ellipse">
               <a:avLst/>
@@ -20436,7 +20436,7 @@
             <a:blipFill rotWithShape="0">
               <a:blip r:embed="rId17"/>
               <a:srcRect/>
-              <a:tile tx="0" ty="0" sx="63120" sy="63120" algn="ctr"/>
+              <a:tile tx="0" ty="0" sx="62411" sy="62411" algn="ctr"/>
             </a:blipFill>
             <a:ln w="0">
               <a:noFill/>
@@ -20484,7 +20484,7 @@
           <p:spPr>
             <a:xfrm flipV="1" rot="5395800">
               <a:off x="10276560" y="4645800"/>
-              <a:ext cx="171000" cy="171000"/>
+              <a:ext cx="170280" cy="170280"/>
             </a:xfrm>
             <a:prstGeom prst="ellipse">
               <a:avLst/>
@@ -20492,7 +20492,7 @@
             <a:blipFill rotWithShape="0">
               <a:blip r:embed="rId18"/>
               <a:srcRect/>
-              <a:tile tx="0" ty="0" sx="63120" sy="63120" algn="ctr"/>
+              <a:tile tx="0" ty="0" sx="62411" sy="62411" algn="ctr"/>
             </a:blipFill>
             <a:ln w="0">
               <a:noFill/>
@@ -20540,7 +20540,7 @@
           <p:spPr>
             <a:xfrm flipV="1" rot="5395800">
               <a:off x="10276920" y="5011560"/>
-              <a:ext cx="171000" cy="171000"/>
+              <a:ext cx="170280" cy="170280"/>
             </a:xfrm>
             <a:prstGeom prst="ellipse">
               <a:avLst/>
@@ -20548,7 +20548,7 @@
             <a:blipFill rotWithShape="0">
               <a:blip r:embed="rId19"/>
               <a:srcRect/>
-              <a:tile tx="0" ty="0" sx="63120" sy="63120" algn="ctr"/>
+              <a:tile tx="0" ty="0" sx="62411" sy="62411" algn="ctr"/>
             </a:blipFill>
             <a:ln w="0">
               <a:noFill/>
@@ -20596,7 +20596,7 @@
           <p:spPr>
             <a:xfrm flipV="1" rot="5395800">
               <a:off x="10276920" y="5377320"/>
-              <a:ext cx="171000" cy="171000"/>
+              <a:ext cx="170280" cy="170280"/>
             </a:xfrm>
             <a:prstGeom prst="ellipse">
               <a:avLst/>
@@ -20604,7 +20604,7 @@
             <a:blipFill rotWithShape="0">
               <a:blip r:embed="rId20"/>
               <a:srcRect/>
-              <a:tile tx="0" ty="0" sx="63120" sy="63120" algn="ctr"/>
+              <a:tile tx="0" ty="0" sx="62411" sy="62411" algn="ctr"/>
             </a:blipFill>
             <a:ln w="0">
               <a:noFill/>
@@ -20652,7 +20652,7 @@
           <p:spPr>
             <a:xfrm flipV="1" rot="5395800">
               <a:off x="10277640" y="5743440"/>
-              <a:ext cx="171000" cy="171000"/>
+              <a:ext cx="170280" cy="170280"/>
             </a:xfrm>
             <a:prstGeom prst="ellipse">
               <a:avLst/>
@@ -20660,7 +20660,7 @@
             <a:blipFill rotWithShape="0">
               <a:blip r:embed="rId21"/>
               <a:srcRect/>
-              <a:tile tx="0" ty="0" sx="63120" sy="63120" algn="ctr"/>
+              <a:tile tx="0" ty="0" sx="62411" sy="62411" algn="ctr"/>
             </a:blipFill>
             <a:ln w="0">
               <a:noFill/>
@@ -20708,7 +20708,7 @@
           <p:spPr>
             <a:xfrm flipV="1" rot="5395800">
               <a:off x="9546120" y="5743800"/>
-              <a:ext cx="171000" cy="171000"/>
+              <a:ext cx="170280" cy="170280"/>
             </a:xfrm>
             <a:prstGeom prst="ellipse">
               <a:avLst/>
@@ -20716,7 +20716,7 @@
             <a:blipFill rotWithShape="0">
               <a:blip r:embed="rId22"/>
               <a:srcRect/>
-              <a:tile tx="0" ty="0" sx="63120" sy="63120" algn="ctr"/>
+              <a:tile tx="0" ty="0" sx="62411" sy="62411" algn="ctr"/>
             </a:blipFill>
             <a:ln w="0">
               <a:noFill/>
@@ -20764,7 +20764,7 @@
           <p:spPr>
             <a:xfrm flipV="1" rot="5395800">
               <a:off x="9545400" y="5378400"/>
-              <a:ext cx="171000" cy="171000"/>
+              <a:ext cx="170280" cy="170280"/>
             </a:xfrm>
             <a:prstGeom prst="ellipse">
               <a:avLst/>
@@ -20772,7 +20772,7 @@
             <a:blipFill rotWithShape="0">
               <a:blip r:embed="rId23"/>
               <a:srcRect/>
-              <a:tile tx="0" ty="0" sx="63120" sy="63120" algn="ctr"/>
+              <a:tile tx="0" ty="0" sx="62411" sy="62411" algn="ctr"/>
             </a:blipFill>
             <a:ln w="0">
               <a:noFill/>
@@ -20820,7 +20820,7 @@
           <p:spPr>
             <a:xfrm flipV="1" rot="5395800">
               <a:off x="9545400" y="5012280"/>
-              <a:ext cx="171000" cy="171000"/>
+              <a:ext cx="170280" cy="170280"/>
             </a:xfrm>
             <a:prstGeom prst="ellipse">
               <a:avLst/>
@@ -20828,7 +20828,7 @@
             <a:blipFill rotWithShape="0">
               <a:blip r:embed="rId24"/>
               <a:srcRect/>
-              <a:tile tx="0" ty="0" sx="63120" sy="63120" algn="ctr"/>
+              <a:tile tx="0" ty="0" sx="62411" sy="62411" algn="ctr"/>
             </a:blipFill>
             <a:ln w="0">
               <a:noFill/>
@@ -20876,7 +20876,7 @@
           <p:spPr>
             <a:xfrm flipV="1" rot="5395800">
               <a:off x="9545040" y="4646520"/>
-              <a:ext cx="171000" cy="171000"/>
+              <a:ext cx="170280" cy="170280"/>
             </a:xfrm>
             <a:prstGeom prst="ellipse">
               <a:avLst/>
@@ -20884,7 +20884,7 @@
             <a:blipFill rotWithShape="0">
               <a:blip r:embed="rId25"/>
               <a:srcRect/>
-              <a:tile tx="0" ty="0" sx="63120" sy="63120" algn="ctr"/>
+              <a:tile tx="0" ty="0" sx="62411" sy="62411" algn="ctr"/>
             </a:blipFill>
             <a:ln w="0">
               <a:noFill/>
@@ -20933,7 +20933,7 @@
         <p:spPr>
           <a:xfrm>
             <a:off x="-146160" y="3109320"/>
-            <a:ext cx="1908360" cy="1908360"/>
+            <a:ext cx="1907640" cy="1907640"/>
           </a:xfrm>
           <a:prstGeom prst="ellipse">
             <a:avLst/>
@@ -21007,8 +21007,8 @@
         </p:nvSpPr>
         <p:spPr>
           <a:xfrm rot="18876000">
-            <a:off x="8637480" y="-393840"/>
-            <a:ext cx="2883600" cy="2883600"/>
+            <a:off x="8636760" y="-393120"/>
+            <a:ext cx="2882880" cy="2882880"/>
           </a:xfrm>
           <a:prstGeom prst="rect">
             <a:avLst/>
@@ -21054,8 +21054,8 @@
         </p:nvSpPr>
         <p:spPr>
           <a:xfrm rot="18876000">
-            <a:off x="8657640" y="3983040"/>
-            <a:ext cx="2883600" cy="2883600"/>
+            <a:off x="8656920" y="3983040"/>
+            <a:ext cx="2882880" cy="2882880"/>
           </a:xfrm>
           <a:prstGeom prst="rect">
             <a:avLst/>
@@ -21101,8 +21101,8 @@
         </p:nvSpPr>
         <p:spPr>
           <a:xfrm rot="18964800">
-            <a:off x="985680" y="5915520"/>
-            <a:ext cx="2576880" cy="719640"/>
+            <a:off x="985320" y="5915520"/>
+            <a:ext cx="2576160" cy="718920"/>
           </a:xfrm>
           <a:prstGeom prst="rect">
             <a:avLst/>
@@ -21150,8 +21150,8 @@
         </p:nvSpPr>
         <p:spPr>
           <a:xfrm rot="18964800">
-            <a:off x="-1293480" y="5513400"/>
-            <a:ext cx="2576880" cy="719640"/>
+            <a:off x="-1293120" y="5513400"/>
+            <a:ext cx="2576160" cy="718920"/>
           </a:xfrm>
           <a:prstGeom prst="rect">
             <a:avLst/>
@@ -21199,8 +21199,8 @@
         </p:nvSpPr>
         <p:spPr>
           <a:xfrm rot="18964800">
-            <a:off x="3673800" y="339480"/>
-            <a:ext cx="3445920" cy="910440"/>
+            <a:off x="3673440" y="339120"/>
+            <a:ext cx="3445200" cy="909720"/>
           </a:xfrm>
           <a:prstGeom prst="rect">
             <a:avLst/>
@@ -21248,8 +21248,8 @@
         </p:nvSpPr>
         <p:spPr>
           <a:xfrm rot="18964800">
-            <a:off x="1437480" y="-747000"/>
-            <a:ext cx="2576880" cy="719640"/>
+            <a:off x="1437120" y="-746280"/>
+            <a:ext cx="2576160" cy="718920"/>
           </a:xfrm>
           <a:prstGeom prst="rect">
             <a:avLst/>
@@ -21298,7 +21298,7 @@
         <p:spPr>
           <a:xfrm rot="18964800">
             <a:off x="-723600" y="3294720"/>
-            <a:ext cx="2576880" cy="501120"/>
+            <a:ext cx="2576160" cy="500400"/>
           </a:xfrm>
           <a:prstGeom prst="rect">
             <a:avLst/>
@@ -21373,7 +21373,7 @@
         <p:spPr>
           <a:xfrm>
             <a:off x="820800" y="4140000"/>
-            <a:ext cx="6187320" cy="1428120"/>
+            <a:ext cx="6186600" cy="1427400"/>
           </a:xfrm>
           <a:prstGeom prst="rect">
             <a:avLst/>
@@ -21433,7 +21433,7 @@
         <p:spPr>
           <a:xfrm>
             <a:off x="7315200" y="4629240"/>
-            <a:ext cx="2365560" cy="482400"/>
+            <a:ext cx="2364840" cy="481680"/>
           </a:xfrm>
           <a:prstGeom prst="rect">
             <a:avLst/>
@@ -21490,7 +21490,7 @@
                 <a:latin typeface="Noto Sans"/>
                 <a:ea typeface="DejaVu Sans"/>
               </a:rPr>
-              <a:t>9 septembre 2024</a:t>
+              <a:t>16 septembre 2024</a:t>
             </a:r>
             <a:endParaRPr b="0" lang="fr-CH" sz="1050" spc="-1" strike="noStrike">
               <a:solidFill>
@@ -21582,7 +21582,7 @@
         <p:spPr>
           <a:xfrm>
             <a:off x="1044000" y="1095120"/>
-            <a:ext cx="8134560" cy="383040"/>
+            <a:ext cx="8133840" cy="382320"/>
           </a:xfrm>
           <a:prstGeom prst="rect">
             <a:avLst/>
@@ -21619,7 +21619,7 @@
                 <a:latin typeface="Noto Sans"/>
                 <a:ea typeface="DejaVu Sans"/>
               </a:rPr>
-              <a:t>Récupération et préparation du jeu de donnée</a:t>
+              <a:t>Préparation du jeu de données</a:t>
             </a:r>
             <a:endParaRPr b="0" lang="fr-CH" sz="2400" spc="-1" strike="noStrike">
               <a:solidFill>
@@ -21639,7 +21639,7 @@
         <p:spPr>
           <a:xfrm>
             <a:off x="1086120" y="1635120"/>
-            <a:ext cx="7722360" cy="3611160"/>
+            <a:ext cx="7721640" cy="3610440"/>
           </a:xfrm>
           <a:prstGeom prst="rect">
             <a:avLst/>
@@ -21865,7 +21865,7 @@
         <p:spPr>
           <a:xfrm>
             <a:off x="1044000" y="1095120"/>
-            <a:ext cx="8134560" cy="383040"/>
+            <a:ext cx="8133840" cy="382320"/>
           </a:xfrm>
           <a:prstGeom prst="rect">
             <a:avLst/>
@@ -21922,7 +21922,7 @@
         <p:spPr>
           <a:xfrm>
             <a:off x="1086120" y="1635120"/>
-            <a:ext cx="7722360" cy="3611160"/>
+            <a:ext cx="7721640" cy="3610440"/>
           </a:xfrm>
           <a:prstGeom prst="rect">
             <a:avLst/>
@@ -22147,7 +22147,7 @@
         <p:spPr>
           <a:xfrm>
             <a:off x="1044000" y="1095120"/>
-            <a:ext cx="8674920" cy="383040"/>
+            <a:ext cx="8674200" cy="382320"/>
           </a:xfrm>
           <a:prstGeom prst="rect">
             <a:avLst/>
@@ -22208,7 +22208,7 @@
         <p:spPr>
           <a:xfrm>
             <a:off x="82080" y="1539360"/>
-            <a:ext cx="4079880" cy="2204640"/>
+            <a:ext cx="4079160" cy="2203920"/>
           </a:xfrm>
           <a:prstGeom prst="rect">
             <a:avLst/>
@@ -22227,7 +22227,7 @@
         <p:spPr>
           <a:xfrm>
             <a:off x="4146120" y="1593720"/>
-            <a:ext cx="5573880" cy="3626280"/>
+            <a:ext cx="5573160" cy="3625560"/>
           </a:xfrm>
           <a:prstGeom prst="rect">
             <a:avLst/>
@@ -22279,7 +22279,6 @@
                 <a:srgbClr val="000000"/>
               </a:solidFill>
               <a:latin typeface="Arial"/>
-              <a:ea typeface="Noto Sans CJK SC"/>
             </a:endParaRPr>
           </a:p>
           <a:p>
@@ -22307,14 +22306,13 @@
                 <a:latin typeface="Noto Sans"/>
                 <a:ea typeface="DejaVu Sans"/>
               </a:rPr>
-              <a:t>Un contient la majorité des questions concernant les fichiers (file) + git et python.</a:t>
+              <a:t>Un contient la majorité des questions concernant les fichiers (file) + git + python.</a:t>
             </a:r>
             <a:endParaRPr b="0" lang="fr-CH" sz="1800" spc="-1" strike="noStrike">
               <a:solidFill>
                 <a:srgbClr val="000000"/>
               </a:solidFill>
               <a:latin typeface="Arial"/>
-              <a:ea typeface="Noto Sans CJK SC"/>
             </a:endParaRPr>
           </a:p>
           <a:p>
@@ -22342,14 +22340,13 @@
                 <a:latin typeface="Noto Sans"/>
                 <a:ea typeface="DejaVu Sans"/>
               </a:rPr>
-              <a:t>Un contient la majorité des questions node/npm et docker.</a:t>
+              <a:t>Un contient la majorité des questions node/npm + docker.</a:t>
             </a:r>
             <a:endParaRPr b="0" lang="fr-CH" sz="1800" spc="-1" strike="noStrike">
               <a:solidFill>
                 <a:srgbClr val="000000"/>
               </a:solidFill>
               <a:latin typeface="Arial"/>
-              <a:ea typeface="Noto Sans CJK SC"/>
             </a:endParaRPr>
           </a:p>
           <a:p>
@@ -22384,7 +22381,6 @@
                 <a:srgbClr val="000000"/>
               </a:solidFill>
               <a:latin typeface="Arial"/>
-              <a:ea typeface="Noto Sans CJK SC"/>
             </a:endParaRPr>
           </a:p>
           <a:p>
@@ -22432,7 +22428,6 @@
                 <a:srgbClr val="000000"/>
               </a:solidFill>
               <a:latin typeface="Arial"/>
-              <a:ea typeface="Noto Sans CJK SC"/>
             </a:endParaRPr>
           </a:p>
         </p:txBody>
@@ -22476,7 +22471,7 @@
         <p:spPr>
           <a:xfrm>
             <a:off x="1044000" y="1095120"/>
-            <a:ext cx="8134560" cy="383040"/>
+            <a:ext cx="8133840" cy="382320"/>
           </a:xfrm>
           <a:prstGeom prst="rect">
             <a:avLst/>
@@ -22533,7 +22528,7 @@
         <p:spPr>
           <a:xfrm>
             <a:off x="1086120" y="1635120"/>
-            <a:ext cx="7722360" cy="3611160"/>
+            <a:ext cx="7721640" cy="3610440"/>
           </a:xfrm>
           <a:prstGeom prst="rect">
             <a:avLst/>
@@ -22578,7 +22573,7 @@
                 <a:latin typeface="Noto Sans"/>
                 <a:ea typeface="DejaVu Sans"/>
               </a:rPr>
-              <a:t>Un modèle Classifier va être hyperoptimisé pour produire les meilleurs résultats. L’optimisation va utiliser 10‘000 questions vu le temps de calcul requis puis le modèle sera entraîné sur toutes les questions avec les meilleurs hyperparamètres.</a:t>
+              <a:t>Un modèle Classifier va être hyperoptimisé pour produire les meilleurs résultats. L’hyperoptimisation va utiliser 10‘000 questions vu le temps de calcul requis puis le modèle sera entraîné sur toutes les questions avec les meilleurs hyperparamètres.</a:t>
             </a:r>
             <a:endParaRPr b="0" lang="fr-CH" sz="1800" spc="-1" strike="noStrike">
               <a:solidFill>
@@ -22696,7 +22691,7 @@
         <p:spPr>
           <a:xfrm>
             <a:off x="1044000" y="1095120"/>
-            <a:ext cx="8134560" cy="383040"/>
+            <a:ext cx="8133840" cy="382320"/>
           </a:xfrm>
           <a:prstGeom prst="rect">
             <a:avLst/>
@@ -22753,7 +22748,7 @@
         <p:spPr>
           <a:xfrm>
             <a:off x="1086120" y="1635120"/>
-            <a:ext cx="7722360" cy="3611160"/>
+            <a:ext cx="7721640" cy="3610440"/>
           </a:xfrm>
           <a:prstGeom prst="rect">
             <a:avLst/>
@@ -22798,7 +22793,7 @@
                 <a:latin typeface="Noto Sans"/>
                 <a:ea typeface="DejaVu Sans"/>
               </a:rPr>
-              <a:t>Six méthodes de plongement lexical (word embedding) vont être utilisées afin de déterminer laquelle produit de meilleurs résultats:</a:t>
+              <a:t>Six méthodes de plongement lexical (word embeddings) vont être utilisées afin de déterminer laquelle produit de meilleurs résultats:</a:t>
             </a:r>
             <a:br>
               <a:rPr sz="1800"/>
@@ -22966,7 +22961,7 @@
         <p:spPr>
           <a:xfrm>
             <a:off x="1044000" y="1095120"/>
-            <a:ext cx="8134560" cy="383040"/>
+            <a:ext cx="8133840" cy="382320"/>
           </a:xfrm>
           <a:prstGeom prst="rect">
             <a:avLst/>
@@ -23023,7 +23018,7 @@
         <p:spPr>
           <a:xfrm>
             <a:off x="1086120" y="1635120"/>
-            <a:ext cx="7722360" cy="3611160"/>
+            <a:ext cx="7721640" cy="3610440"/>
           </a:xfrm>
           <a:prstGeom prst="rect">
             <a:avLst/>
@@ -23189,7 +23184,7 @@
         <p:spPr>
           <a:xfrm>
             <a:off x="1044000" y="1095120"/>
-            <a:ext cx="8134560" cy="383040"/>
+            <a:ext cx="8133840" cy="382320"/>
           </a:xfrm>
           <a:prstGeom prst="rect">
             <a:avLst/>
@@ -23250,7 +23245,7 @@
         <p:spPr>
           <a:xfrm>
             <a:off x="180000" y="1512000"/>
-            <a:ext cx="4729320" cy="2519640"/>
+            <a:ext cx="4728600" cy="2518920"/>
           </a:xfrm>
           <a:prstGeom prst="rect">
             <a:avLst/>
@@ -23273,7 +23268,7 @@
         <p:spPr>
           <a:xfrm>
             <a:off x="5170680" y="1512000"/>
-            <a:ext cx="4728960" cy="2519640"/>
+            <a:ext cx="4728240" cy="2518920"/>
           </a:xfrm>
           <a:prstGeom prst="rect">
             <a:avLst/>
@@ -23296,7 +23291,7 @@
         <p:spPr>
           <a:xfrm>
             <a:off x="180000" y="4066200"/>
-            <a:ext cx="6462360" cy="1513440"/>
+            <a:ext cx="6461640" cy="1512720"/>
           </a:xfrm>
           <a:prstGeom prst="rect">
             <a:avLst/>
@@ -23345,7 +23340,7 @@
         <p:spPr>
           <a:xfrm>
             <a:off x="1044000" y="1095120"/>
-            <a:ext cx="8134560" cy="383040"/>
+            <a:ext cx="8133840" cy="382320"/>
           </a:xfrm>
           <a:prstGeom prst="rect">
             <a:avLst/>
@@ -23406,7 +23401,7 @@
         <p:spPr>
           <a:xfrm>
             <a:off x="5184000" y="1671120"/>
-            <a:ext cx="4632840" cy="2468520"/>
+            <a:ext cx="4632120" cy="2467800"/>
           </a:xfrm>
           <a:prstGeom prst="rect">
             <a:avLst/>
@@ -23429,7 +23424,7 @@
         <p:spPr>
           <a:xfrm>
             <a:off x="233280" y="1667520"/>
-            <a:ext cx="4640040" cy="2472120"/>
+            <a:ext cx="4639320" cy="2471400"/>
           </a:xfrm>
           <a:prstGeom prst="rect">
             <a:avLst/>
@@ -23478,7 +23473,7 @@
         <p:spPr>
           <a:xfrm>
             <a:off x="1044000" y="1095120"/>
-            <a:ext cx="8134560" cy="383040"/>
+            <a:ext cx="8133840" cy="382320"/>
           </a:xfrm>
           <a:prstGeom prst="rect">
             <a:avLst/>
@@ -23535,7 +23530,7 @@
         <p:spPr>
           <a:xfrm>
             <a:off x="1086120" y="1635120"/>
-            <a:ext cx="7722360" cy="3611160"/>
+            <a:ext cx="7721640" cy="3610440"/>
           </a:xfrm>
           <a:prstGeom prst="rect">
             <a:avLst/>
@@ -23591,6 +23586,7 @@
                   <a:srgbClr val="808080"/>
                 </a:solidFill>
                 <a:latin typeface="Noto Sans"/>
+                <a:ea typeface="DejaVu Sans"/>
               </a:rPr>
               <a:t> </a:t>
             </a:r>
@@ -23747,7 +23743,7 @@
         <p:spPr>
           <a:xfrm>
             <a:off x="1044000" y="1095120"/>
-            <a:ext cx="8134560" cy="383040"/>
+            <a:ext cx="8133840" cy="382320"/>
           </a:xfrm>
           <a:prstGeom prst="rect">
             <a:avLst/>
@@ -23803,8 +23799,8 @@
         </p:nvSpPr>
         <p:spPr>
           <a:xfrm>
-            <a:off x="1086120" y="1635120"/>
-            <a:ext cx="7722360" cy="3611160"/>
+            <a:off x="834120" y="1491120"/>
+            <a:ext cx="7721640" cy="3610440"/>
           </a:xfrm>
           <a:prstGeom prst="rect">
             <a:avLst/>
@@ -23904,7 +23900,7 @@
               <a:buChar char=""/>
             </a:pPr>
             <a:r>
-              <a:rPr b="0" lang="de-DE" sz="1800" spc="-1" strike="noStrike">
+              <a:rPr b="0" lang="fr-CH" sz="1800" spc="-1" strike="noStrike">
                 <a:solidFill>
                   <a:srgbClr val="808080"/>
                 </a:solidFill>
@@ -24085,7 +24081,7 @@
                 <a:latin typeface="Noto Sans"/>
                 <a:ea typeface="DejaVu Sans"/>
               </a:rPr>
-              <a:t>Examen et gouvernance des modèles</a:t>
+              <a:t>Examen et maintenance des modèles</a:t>
             </a:r>
             <a:endParaRPr b="0" lang="fr-CH" sz="1800" spc="-1" strike="noStrike">
               <a:solidFill>
@@ -24180,7 +24176,7 @@
         <p:spPr>
           <a:xfrm>
             <a:off x="1121760" y="1748880"/>
-            <a:ext cx="6822360" cy="3110040"/>
+            <a:ext cx="6821640" cy="3109320"/>
           </a:xfrm>
           <a:prstGeom prst="rect">
             <a:avLst/>
@@ -24435,7 +24431,7 @@
         <p:spPr>
           <a:xfrm>
             <a:off x="1080000" y="1080000"/>
-            <a:ext cx="3853800" cy="383040"/>
+            <a:ext cx="3853080" cy="382320"/>
           </a:xfrm>
           <a:prstGeom prst="rect">
             <a:avLst/>
@@ -24519,7 +24515,7 @@
         <p:spPr>
           <a:xfrm>
             <a:off x="1044000" y="1095120"/>
-            <a:ext cx="8134560" cy="383040"/>
+            <a:ext cx="8133840" cy="382320"/>
           </a:xfrm>
           <a:prstGeom prst="rect">
             <a:avLst/>
@@ -24576,7 +24572,7 @@
         <p:spPr>
           <a:xfrm>
             <a:off x="1086120" y="1635120"/>
-            <a:ext cx="7722360" cy="3611160"/>
+            <a:ext cx="7721640" cy="3610440"/>
           </a:xfrm>
           <a:prstGeom prst="rect">
             <a:avLst/>
@@ -24842,7 +24838,7 @@
         <p:spPr>
           <a:xfrm>
             <a:off x="1044000" y="1095120"/>
-            <a:ext cx="8134560" cy="383040"/>
+            <a:ext cx="8133840" cy="382320"/>
           </a:xfrm>
           <a:prstGeom prst="rect">
             <a:avLst/>
@@ -24899,7 +24895,7 @@
         <p:spPr>
           <a:xfrm>
             <a:off x="1086120" y="1635120"/>
-            <a:ext cx="7722360" cy="3611160"/>
+            <a:ext cx="7721640" cy="3610440"/>
           </a:xfrm>
           <a:prstGeom prst="rect">
             <a:avLst/>
@@ -25019,7 +25015,7 @@
                 <a:latin typeface="Noto Sans"/>
                 <a:ea typeface="DejaVu Sans"/>
               </a:rPr>
-              <a:t>Tests unitaire du traitement des données.</a:t>
+              <a:t>Tests unitaires du traitement des données.</a:t>
             </a:r>
             <a:endParaRPr b="0" lang="fr-CH" sz="1800" spc="-1" strike="noStrike">
               <a:solidFill>
@@ -25137,7 +25133,7 @@
         <p:spPr>
           <a:xfrm>
             <a:off x="1429200" y="36000"/>
-            <a:ext cx="6670080" cy="5590800"/>
+            <a:ext cx="6669360" cy="5590080"/>
           </a:xfrm>
           <a:prstGeom prst="rect">
             <a:avLst/>
@@ -25186,7 +25182,7 @@
         <p:spPr>
           <a:xfrm>
             <a:off x="1080000" y="1080000"/>
-            <a:ext cx="8448480" cy="383040"/>
+            <a:ext cx="8447760" cy="382320"/>
           </a:xfrm>
           <a:prstGeom prst="rect">
             <a:avLst/>
@@ -25240,7 +25236,7 @@
         <p:spPr>
           <a:xfrm>
             <a:off x="1086120" y="1635120"/>
-            <a:ext cx="7722360" cy="3611160"/>
+            <a:ext cx="7721640" cy="3610440"/>
           </a:xfrm>
           <a:prstGeom prst="rect">
             <a:avLst/>
@@ -25391,7 +25387,7 @@
         <p:spPr>
           <a:xfrm>
             <a:off x="1080000" y="1080000"/>
-            <a:ext cx="8448480" cy="383040"/>
+            <a:ext cx="8447760" cy="382320"/>
           </a:xfrm>
           <a:prstGeom prst="rect">
             <a:avLst/>
@@ -25475,7 +25471,7 @@
         <p:spPr>
           <a:xfrm>
             <a:off x="1080000" y="1080000"/>
-            <a:ext cx="4489920" cy="383040"/>
+            <a:ext cx="4489200" cy="382320"/>
           </a:xfrm>
           <a:prstGeom prst="rect">
             <a:avLst/>
@@ -25529,7 +25525,7 @@
         <p:spPr>
           <a:xfrm>
             <a:off x="1086120" y="1609560"/>
-            <a:ext cx="7722360" cy="3245760"/>
+            <a:ext cx="7721640" cy="3245040"/>
           </a:xfrm>
           <a:prstGeom prst="rect">
             <a:avLst/>
@@ -25645,7 +25641,7 @@
                 <a:latin typeface="Noto Sans"/>
                 <a:ea typeface="DejaVu Sans"/>
               </a:rPr>
-              <a:t>Une démarche orientée MLOps va être produite afin d’automatiser et d’industrialiser le cycle de vie d’élaboration du modèle de classification supervisée.</a:t>
+              <a:t>Une démarche orientée MLOps va également être produite afin d’automatiser  le cycle de vie du modèle de classification supervisée.</a:t>
             </a:r>
             <a:endParaRPr b="0" lang="fr-CH" sz="1800" spc="-1" strike="noStrike">
               <a:solidFill>
@@ -25743,7 +25739,7 @@
         <p:spPr>
           <a:xfrm>
             <a:off x="1044000" y="1095120"/>
-            <a:ext cx="8134560" cy="383040"/>
+            <a:ext cx="8133840" cy="382320"/>
           </a:xfrm>
           <a:prstGeom prst="rect">
             <a:avLst/>
@@ -25780,7 +25776,7 @@
                 <a:latin typeface="Noto Sans"/>
                 <a:ea typeface="DejaVu Sans"/>
               </a:rPr>
-              <a:t>Récupération et préparation du jeu de donnée</a:t>
+              <a:t>Récupération du jeu de données</a:t>
             </a:r>
             <a:endParaRPr b="0" lang="fr-CH" sz="2400" spc="-1" strike="noStrike">
               <a:solidFill>
@@ -25800,7 +25796,7 @@
         <p:spPr>
           <a:xfrm>
             <a:off x="1086120" y="1635120"/>
-            <a:ext cx="7722360" cy="3611160"/>
+            <a:ext cx="7721640" cy="3610440"/>
           </a:xfrm>
           <a:prstGeom prst="rect">
             <a:avLst/>
@@ -25820,6 +25816,41 @@
           <a:bodyPr lIns="90000" rIns="90000" tIns="45000" bIns="45000" anchor="t">
             <a:noAutofit/>
           </a:bodyPr>
+          <a:p>
+            <a:pPr marL="216000" indent="-215640" algn="just">
+              <a:lnSpc>
+                <a:spcPct val="100000"/>
+              </a:lnSpc>
+              <a:spcBef>
+                <a:spcPts val="624"/>
+              </a:spcBef>
+              <a:spcAft>
+                <a:spcPts val="425"/>
+              </a:spcAft>
+              <a:buClr>
+                <a:srgbClr val="000000"/>
+              </a:buClr>
+              <a:buSzPct val="45000"/>
+              <a:buFont typeface="Wingdings" charset="2"/>
+              <a:buChar char=""/>
+            </a:pPr>
+            <a:r>
+              <a:rPr b="0" lang="de-DE" sz="1800" spc="-1" strike="noStrike">
+                <a:solidFill>
+                  <a:srgbClr val="808080"/>
+                </a:solidFill>
+                <a:latin typeface="Noto Sans"/>
+                <a:ea typeface="DejaVu Sans"/>
+              </a:rPr>
+              <a:t>Les questions choisis sont celles qui ont plus de 100 votes pour garantir leur qualité et datent de 2010 à fin 2022. Elles ont toutes au moins un tag et sont récupérées via la StackAPI. </a:t>
+            </a:r>
+            <a:endParaRPr b="0" lang="fr-CH" sz="1800" spc="-1" strike="noStrike">
+              <a:solidFill>
+                <a:srgbClr val="000000"/>
+              </a:solidFill>
+              <a:latin typeface="Arial"/>
+            </a:endParaRPr>
+          </a:p>
           <a:p>
             <a:pPr marL="216000" indent="-215640" algn="just">
               <a:lnSpc>
@@ -25876,42 +25907,7 @@
                 <a:latin typeface="Noto Sans"/>
                 <a:ea typeface="DejaVu Sans"/>
               </a:rPr>
-              <a:t> vont être utilisées pour l’entraînement des modèles.</a:t>
-            </a:r>
-            <a:endParaRPr b="0" lang="fr-CH" sz="1800" spc="-1" strike="noStrike">
-              <a:solidFill>
-                <a:srgbClr val="000000"/>
-              </a:solidFill>
-              <a:latin typeface="Arial"/>
-            </a:endParaRPr>
-          </a:p>
-          <a:p>
-            <a:pPr marL="216000" indent="-215640" algn="just">
-              <a:lnSpc>
-                <a:spcPct val="100000"/>
-              </a:lnSpc>
-              <a:spcBef>
-                <a:spcPts val="624"/>
-              </a:spcBef>
-              <a:spcAft>
-                <a:spcPts val="425"/>
-              </a:spcAft>
-              <a:buClr>
-                <a:srgbClr val="000000"/>
-              </a:buClr>
-              <a:buSzPct val="45000"/>
-              <a:buFont typeface="Wingdings" charset="2"/>
-              <a:buChar char=""/>
-            </a:pPr>
-            <a:r>
-              <a:rPr b="0" lang="de-DE" sz="1800" spc="-1" strike="noStrike">
-                <a:solidFill>
-                  <a:srgbClr val="808080"/>
-                </a:solidFill>
-                <a:latin typeface="Noto Sans"/>
-                <a:ea typeface="DejaVu Sans"/>
-              </a:rPr>
-              <a:t>Les questions choisis sont celles qui ont plus de 100 votes pour garantir leur qualité et datent de 2010 à fin 2022. Elles ont toutes au moins un tag et sont récupérées via la StackAPI. Pour télécharger les ~50’000 questions une clé de StackAPI est requis.</a:t>
+              <a:t> vont être utilisées pour l’entraînement des modèles. Pour les télécharger une clé de StackAPI est requis.</a:t>
             </a:r>
             <a:endParaRPr b="0" lang="fr-CH" sz="1800" spc="-1" strike="noStrike">
               <a:solidFill>
@@ -26000,7 +25996,7 @@
         <p:spPr>
           <a:xfrm>
             <a:off x="197280" y="1658520"/>
-            <a:ext cx="6256800" cy="3200040"/>
+            <a:ext cx="6256080" cy="3199320"/>
           </a:xfrm>
           <a:prstGeom prst="rect">
             <a:avLst/>
@@ -26023,7 +26019,7 @@
         <p:spPr>
           <a:xfrm>
             <a:off x="6671520" y="632520"/>
-            <a:ext cx="2903040" cy="2462040"/>
+            <a:ext cx="2902320" cy="2461320"/>
           </a:xfrm>
           <a:prstGeom prst="rect">
             <a:avLst/>
@@ -26046,7 +26042,7 @@
         <p:spPr>
           <a:xfrm>
             <a:off x="6660000" y="3262680"/>
-            <a:ext cx="2944800" cy="2135880"/>
+            <a:ext cx="2944080" cy="2135160"/>
           </a:xfrm>
           <a:prstGeom prst="rect">
             <a:avLst/>
@@ -26099,7 +26095,7 @@
         <p:spPr>
           <a:xfrm>
             <a:off x="72000" y="1029960"/>
-            <a:ext cx="4966560" cy="4496400"/>
+            <a:ext cx="4965840" cy="4495680"/>
           </a:xfrm>
           <a:prstGeom prst="rect">
             <a:avLst/>
@@ -26122,7 +26118,7 @@
         <p:spPr>
           <a:xfrm>
             <a:off x="5103000" y="1008000"/>
-            <a:ext cx="4903560" cy="4527360"/>
+            <a:ext cx="4902840" cy="4526640"/>
           </a:xfrm>
           <a:prstGeom prst="rect">
             <a:avLst/>
@@ -26175,7 +26171,7 @@
         <p:spPr>
           <a:xfrm>
             <a:off x="474480" y="360000"/>
-            <a:ext cx="4462560" cy="2230560"/>
+            <a:ext cx="4461840" cy="2229840"/>
           </a:xfrm>
           <a:prstGeom prst="rect">
             <a:avLst/>
@@ -26198,7 +26194,7 @@
         <p:spPr>
           <a:xfrm>
             <a:off x="5184000" y="360000"/>
-            <a:ext cx="4462560" cy="2230560"/>
+            <a:ext cx="4461840" cy="2229840"/>
           </a:xfrm>
           <a:prstGeom prst="rect">
             <a:avLst/>
@@ -26217,7 +26213,7 @@
         <p:spPr>
           <a:xfrm>
             <a:off x="1476000" y="2592000"/>
-            <a:ext cx="2518560" cy="399960"/>
+            <a:ext cx="2517840" cy="399240"/>
           </a:xfrm>
           <a:prstGeom prst="rect">
             <a:avLst/>
@@ -26277,7 +26273,7 @@
         <p:spPr>
           <a:xfrm>
             <a:off x="6120000" y="2592360"/>
-            <a:ext cx="2518560" cy="399960"/>
+            <a:ext cx="2517840" cy="399240"/>
           </a:xfrm>
           <a:prstGeom prst="rect">
             <a:avLst/>
@@ -26341,7 +26337,7 @@
         <p:spPr>
           <a:xfrm>
             <a:off x="798480" y="3099240"/>
-            <a:ext cx="3808080" cy="1903320"/>
+            <a:ext cx="3807360" cy="1902600"/>
           </a:xfrm>
           <a:prstGeom prst="rect">
             <a:avLst/>
@@ -26364,7 +26360,7 @@
         <p:spPr>
           <a:xfrm>
             <a:off x="5370480" y="3063240"/>
-            <a:ext cx="3808080" cy="1903320"/>
+            <a:ext cx="3807360" cy="1902600"/>
           </a:xfrm>
           <a:prstGeom prst="rect">
             <a:avLst/>
@@ -26383,7 +26379,7 @@
         <p:spPr>
           <a:xfrm>
             <a:off x="936000" y="4932360"/>
-            <a:ext cx="3598560" cy="466200"/>
+            <a:ext cx="3597840" cy="465480"/>
           </a:xfrm>
           <a:prstGeom prst="rect">
             <a:avLst/>
@@ -26443,7 +26439,7 @@
         <p:spPr>
           <a:xfrm>
             <a:off x="5256000" y="4968720"/>
-            <a:ext cx="3994560" cy="711000"/>
+            <a:ext cx="3993840" cy="710280"/>
           </a:xfrm>
           <a:prstGeom prst="rect">
             <a:avLst/>
@@ -26537,7 +26533,7 @@
         <p:spPr>
           <a:xfrm>
             <a:off x="180000" y="1370160"/>
-            <a:ext cx="4858560" cy="3812400"/>
+            <a:ext cx="4857840" cy="3811680"/>
           </a:xfrm>
           <a:prstGeom prst="rect">
             <a:avLst/>
@@ -26560,7 +26556,7 @@
         <p:spPr>
           <a:xfrm>
             <a:off x="5076000" y="1356120"/>
-            <a:ext cx="4947480" cy="3826440"/>
+            <a:ext cx="4946760" cy="3825720"/>
           </a:xfrm>
           <a:prstGeom prst="rect">
             <a:avLst/>
@@ -26609,7 +26605,7 @@
         <p:spPr>
           <a:xfrm>
             <a:off x="1044000" y="1095120"/>
-            <a:ext cx="8134560" cy="383040"/>
+            <a:ext cx="8133840" cy="382320"/>
           </a:xfrm>
           <a:prstGeom prst="rect">
             <a:avLst/>
@@ -26646,7 +26642,7 @@
                 <a:latin typeface="Noto Sans"/>
                 <a:ea typeface="DejaVu Sans"/>
               </a:rPr>
-              <a:t>Récupération et préparation du jeu de donnée</a:t>
+              <a:t>Préparation du jeu de données</a:t>
             </a:r>
             <a:endParaRPr b="0" lang="fr-CH" sz="2400" spc="-1" strike="noStrike">
               <a:solidFill>
@@ -26666,7 +26662,7 @@
         <p:spPr>
           <a:xfrm>
             <a:off x="1086120" y="1635120"/>
-            <a:ext cx="7722360" cy="3611160"/>
+            <a:ext cx="7721640" cy="3610440"/>
           </a:xfrm>
           <a:prstGeom prst="rect">
             <a:avLst/>
@@ -26922,7 +26918,27 @@
                 <a:latin typeface="Noto Sans"/>
                 <a:ea typeface="DejaVu Sans"/>
               </a:rPr>
-              <a:t>Suppression des stopwords tels que alors ou quand</a:t>
+              <a:t>Suppression des stopwords tels </a:t>
+            </a:r>
+            <a:r>
+              <a:rPr b="0" lang="fr-CH" sz="1800" spc="-1" strike="noStrike">
+                <a:solidFill>
+                  <a:srgbClr val="808080"/>
+                </a:solidFill>
+                <a:latin typeface="Noto Sans"/>
+                <a:ea typeface="DejaVu Sans"/>
+              </a:rPr>
+              <a:t>que</a:t>
+            </a:r>
+            <a:r>
+              <a:rPr b="0" lang="de-DE" sz="1800" spc="-1" strike="noStrike">
+                <a:solidFill>
+                  <a:srgbClr val="808080"/>
+                </a:solidFill>
+                <a:latin typeface="Noto Sans"/>
+                <a:ea typeface="DejaVu Sans"/>
+              </a:rPr>
+              <a:t> “alors“ ou “quand“</a:t>
             </a:r>
             <a:endParaRPr b="0" lang="fr-CH" sz="1800" spc="-1" strike="noStrike">
               <a:solidFill>
@@ -26950,7 +26966,7 @@
               <a:buChar char=""/>
             </a:pPr>
             <a:r>
-              <a:rPr b="0" lang="de-DE" sz="1800" spc="-1" strike="noStrike">
+              <a:rPr b="0" lang="fr-CH" sz="1800" spc="-1" strike="noStrike">
                 <a:solidFill>
                   <a:srgbClr val="808080"/>
                 </a:solidFill>

</xml_diff>